<commit_message>
not sure if I changed something
</commit_message>
<xml_diff>
--- a/220826_update_dataanalyses.pptx
+++ b/220826_update_dataanalyses.pptx
@@ -6,20 +6,21 @@
   </p:sldMasterIdLst>
   <p:sldIdLst>
     <p:sldId id="256" r:id="rId2"/>
-    <p:sldId id="258" r:id="rId3"/>
-    <p:sldId id="260" r:id="rId4"/>
-    <p:sldId id="262" r:id="rId5"/>
-    <p:sldId id="261" r:id="rId6"/>
-    <p:sldId id="263" r:id="rId7"/>
-    <p:sldId id="265" r:id="rId8"/>
-    <p:sldId id="272" r:id="rId9"/>
-    <p:sldId id="266" r:id="rId10"/>
-    <p:sldId id="259" r:id="rId11"/>
-    <p:sldId id="267" r:id="rId12"/>
-    <p:sldId id="268" r:id="rId13"/>
-    <p:sldId id="269" r:id="rId14"/>
-    <p:sldId id="270" r:id="rId15"/>
-    <p:sldId id="271" r:id="rId16"/>
+    <p:sldId id="273" r:id="rId3"/>
+    <p:sldId id="258" r:id="rId4"/>
+    <p:sldId id="260" r:id="rId5"/>
+    <p:sldId id="262" r:id="rId6"/>
+    <p:sldId id="261" r:id="rId7"/>
+    <p:sldId id="263" r:id="rId8"/>
+    <p:sldId id="265" r:id="rId9"/>
+    <p:sldId id="272" r:id="rId10"/>
+    <p:sldId id="266" r:id="rId11"/>
+    <p:sldId id="259" r:id="rId12"/>
+    <p:sldId id="267" r:id="rId13"/>
+    <p:sldId id="268" r:id="rId14"/>
+    <p:sldId id="269" r:id="rId15"/>
+    <p:sldId id="270" r:id="rId16"/>
+    <p:sldId id="271" r:id="rId17"/>
   </p:sldIdLst>
   <p:sldSz cx="12192000" cy="6858000"/>
   <p:notesSz cx="6858000" cy="9144000"/>
@@ -273,7 +274,7 @@
           <a:p>
             <a:fld id="{1F8074E5-8295-406D-869B-65A06D05B2D0}" type="datetimeFigureOut">
               <a:rPr lang="de-DE" smtClean="0"/>
-              <a:t>26.08.2022</a:t>
+              <a:t>30.08.2022</a:t>
             </a:fld>
             <a:endParaRPr lang="de-DE"/>
           </a:p>
@@ -471,7 +472,7 @@
           <a:p>
             <a:fld id="{1F8074E5-8295-406D-869B-65A06D05B2D0}" type="datetimeFigureOut">
               <a:rPr lang="de-DE" smtClean="0"/>
-              <a:t>26.08.2022</a:t>
+              <a:t>30.08.2022</a:t>
             </a:fld>
             <a:endParaRPr lang="de-DE"/>
           </a:p>
@@ -679,7 +680,7 @@
           <a:p>
             <a:fld id="{1F8074E5-8295-406D-869B-65A06D05B2D0}" type="datetimeFigureOut">
               <a:rPr lang="de-DE" smtClean="0"/>
-              <a:t>26.08.2022</a:t>
+              <a:t>30.08.2022</a:t>
             </a:fld>
             <a:endParaRPr lang="de-DE"/>
           </a:p>
@@ -877,7 +878,7 @@
           <a:p>
             <a:fld id="{1F8074E5-8295-406D-869B-65A06D05B2D0}" type="datetimeFigureOut">
               <a:rPr lang="de-DE" smtClean="0"/>
-              <a:t>26.08.2022</a:t>
+              <a:t>30.08.2022</a:t>
             </a:fld>
             <a:endParaRPr lang="de-DE"/>
           </a:p>
@@ -1152,7 +1153,7 @@
           <a:p>
             <a:fld id="{1F8074E5-8295-406D-869B-65A06D05B2D0}" type="datetimeFigureOut">
               <a:rPr lang="de-DE" smtClean="0"/>
-              <a:t>26.08.2022</a:t>
+              <a:t>30.08.2022</a:t>
             </a:fld>
             <a:endParaRPr lang="de-DE"/>
           </a:p>
@@ -1417,7 +1418,7 @@
           <a:p>
             <a:fld id="{1F8074E5-8295-406D-869B-65A06D05B2D0}" type="datetimeFigureOut">
               <a:rPr lang="de-DE" smtClean="0"/>
-              <a:t>26.08.2022</a:t>
+              <a:t>30.08.2022</a:t>
             </a:fld>
             <a:endParaRPr lang="de-DE"/>
           </a:p>
@@ -1829,7 +1830,7 @@
           <a:p>
             <a:fld id="{1F8074E5-8295-406D-869B-65A06D05B2D0}" type="datetimeFigureOut">
               <a:rPr lang="de-DE" smtClean="0"/>
-              <a:t>26.08.2022</a:t>
+              <a:t>30.08.2022</a:t>
             </a:fld>
             <a:endParaRPr lang="de-DE"/>
           </a:p>
@@ -1970,7 +1971,7 @@
           <a:p>
             <a:fld id="{1F8074E5-8295-406D-869B-65A06D05B2D0}" type="datetimeFigureOut">
               <a:rPr lang="de-DE" smtClean="0"/>
-              <a:t>26.08.2022</a:t>
+              <a:t>30.08.2022</a:t>
             </a:fld>
             <a:endParaRPr lang="de-DE"/>
           </a:p>
@@ -2083,7 +2084,7 @@
           <a:p>
             <a:fld id="{1F8074E5-8295-406D-869B-65A06D05B2D0}" type="datetimeFigureOut">
               <a:rPr lang="de-DE" smtClean="0"/>
-              <a:t>26.08.2022</a:t>
+              <a:t>30.08.2022</a:t>
             </a:fld>
             <a:endParaRPr lang="de-DE"/>
           </a:p>
@@ -2394,7 +2395,7 @@
           <a:p>
             <a:fld id="{1F8074E5-8295-406D-869B-65A06D05B2D0}" type="datetimeFigureOut">
               <a:rPr lang="de-DE" smtClean="0"/>
-              <a:t>26.08.2022</a:t>
+              <a:t>30.08.2022</a:t>
             </a:fld>
             <a:endParaRPr lang="de-DE"/>
           </a:p>
@@ -2682,7 +2683,7 @@
           <a:p>
             <a:fld id="{1F8074E5-8295-406D-869B-65A06D05B2D0}" type="datetimeFigureOut">
               <a:rPr lang="de-DE" smtClean="0"/>
-              <a:t>26.08.2022</a:t>
+              <a:t>30.08.2022</a:t>
             </a:fld>
             <a:endParaRPr lang="de-DE"/>
           </a:p>
@@ -2923,7 +2924,7 @@
           <a:p>
             <a:fld id="{1F8074E5-8295-406D-869B-65A06D05B2D0}" type="datetimeFigureOut">
               <a:rPr lang="de-DE" smtClean="0"/>
-              <a:t>26.08.2022</a:t>
+              <a:t>30.08.2022</a:t>
             </a:fld>
             <a:endParaRPr lang="de-DE"/>
           </a:p>
@@ -3439,7 +3440,7 @@
           <p:cNvPr id="2" name="Titel 1">
             <a:extLst>
               <a:ext uri="{FF2B5EF4-FFF2-40B4-BE49-F238E27FC236}">
-                <a16:creationId xmlns:a16="http://schemas.microsoft.com/office/drawing/2014/main" id="{E8D505D1-C9ED-45EB-ABF9-12C67A397336}"/>
+                <a16:creationId xmlns:a16="http://schemas.microsoft.com/office/drawing/2014/main" id="{FECB4B52-5B3A-4F59-B3E5-2C791414DFBF}"/>
               </a:ext>
             </a:extLst>
           </p:cNvPr>
@@ -3456,431 +3457,326 @@
           <a:lstStyle/>
           <a:p>
             <a:r>
-              <a:rPr lang="de-DE" dirty="0"/>
-              <a:t>Cluster-</a:t>
-            </a:r>
-            <a:r>
-              <a:rPr lang="de-DE" dirty="0" err="1"/>
-              <a:t>based</a:t>
-            </a:r>
-            <a:r>
-              <a:rPr lang="de-DE" dirty="0"/>
-              <a:t> </a:t>
-            </a:r>
-            <a:r>
-              <a:rPr lang="de-DE" dirty="0" err="1"/>
-              <a:t>permutation</a:t>
-            </a:r>
-            <a:r>
-              <a:rPr lang="de-DE" dirty="0"/>
-              <a:t> </a:t>
-            </a:r>
-            <a:r>
-              <a:rPr lang="de-DE" dirty="0" err="1"/>
-              <a:t>test</a:t>
-            </a:r>
-            <a:r>
-              <a:rPr lang="de-DE" dirty="0"/>
-              <a:t>: Task A</a:t>
-            </a:r>
-          </a:p>
-        </p:txBody>
-      </p:sp>
-      <p:sp>
-        <p:nvSpPr>
-          <p:cNvPr id="3" name="Inhaltsplatzhalter 2">
-            <a:extLst>
-              <a:ext uri="{FF2B5EF4-FFF2-40B4-BE49-F238E27FC236}">
-                <a16:creationId xmlns:a16="http://schemas.microsoft.com/office/drawing/2014/main" id="{F44E030C-11C5-472B-900D-BC76B88397E0}"/>
-              </a:ext>
-            </a:extLst>
-          </p:cNvPr>
-          <p:cNvSpPr>
-            <a:spLocks noGrp="1"/>
-          </p:cNvSpPr>
-          <p:nvPr>
-            <p:ph idx="1"/>
-          </p:nvPr>
-        </p:nvSpPr>
-        <p:spPr/>
-        <p:txBody>
-          <a:bodyPr>
-            <a:normAutofit lnSpcReduction="10000"/>
-          </a:bodyPr>
-          <a:lstStyle/>
-          <a:p>
-            <a:r>
-              <a:rPr lang="de-DE" dirty="0"/>
-              <a:t>Constant vs. </a:t>
-            </a:r>
-            <a:r>
-              <a:rPr lang="de-DE" dirty="0" err="1"/>
-              <a:t>random</a:t>
-            </a:r>
-            <a:r>
-              <a:rPr lang="de-DE" dirty="0"/>
-              <a:t> 1:</a:t>
-            </a:r>
-          </a:p>
-          <a:p>
-            <a:pPr lvl="1"/>
-            <a:r>
-              <a:rPr lang="de-DE" b="1" dirty="0" err="1"/>
-              <a:t>Significant</a:t>
-            </a:r>
-            <a:r>
-              <a:rPr lang="de-DE" dirty="0"/>
-              <a:t> </a:t>
-            </a:r>
-            <a:r>
-              <a:rPr lang="de-DE" dirty="0" err="1"/>
-              <a:t>difference</a:t>
-            </a:r>
-            <a:r>
-              <a:rPr lang="de-DE" dirty="0"/>
-              <a:t> in </a:t>
-            </a:r>
-            <a:r>
-              <a:rPr lang="de-DE" dirty="0" err="1"/>
-              <a:t>theta</a:t>
-            </a:r>
-            <a:r>
-              <a:rPr lang="de-DE" dirty="0"/>
-              <a:t> band: 5 negative </a:t>
-            </a:r>
-            <a:r>
-              <a:rPr lang="de-DE" dirty="0" err="1"/>
-              <a:t>clusters</a:t>
-            </a:r>
-            <a:r>
-              <a:rPr lang="de-DE" dirty="0"/>
-              <a:t> (</a:t>
-            </a:r>
-            <a:r>
-              <a:rPr lang="de-DE" dirty="0" err="1"/>
-              <a:t>sig</a:t>
-            </a:r>
-            <a:r>
-              <a:rPr lang="de-DE" dirty="0"/>
-              <a:t>)</a:t>
-            </a:r>
-          </a:p>
-          <a:p>
-            <a:pPr lvl="1"/>
-            <a:r>
-              <a:rPr lang="de-DE" b="1" dirty="0" err="1"/>
-              <a:t>Significant</a:t>
-            </a:r>
-            <a:r>
-              <a:rPr lang="de-DE" b="1" dirty="0"/>
-              <a:t> </a:t>
-            </a:r>
-            <a:r>
-              <a:rPr lang="de-DE" dirty="0" err="1"/>
-              <a:t>difference</a:t>
-            </a:r>
-            <a:r>
-              <a:rPr lang="de-DE" dirty="0"/>
-              <a:t> in </a:t>
-            </a:r>
-            <a:r>
-              <a:rPr lang="de-DE" dirty="0" err="1"/>
-              <a:t>alpha</a:t>
-            </a:r>
-            <a:r>
-              <a:rPr lang="de-DE" dirty="0"/>
-              <a:t> band: 9 negative </a:t>
-            </a:r>
-            <a:r>
-              <a:rPr lang="de-DE" dirty="0" err="1"/>
-              <a:t>clusters</a:t>
-            </a:r>
-            <a:r>
-              <a:rPr lang="de-DE" dirty="0"/>
-              <a:t> (</a:t>
-            </a:r>
-            <a:r>
-              <a:rPr lang="de-DE" dirty="0" err="1"/>
-              <a:t>sig</a:t>
-            </a:r>
-            <a:r>
-              <a:rPr lang="de-DE" dirty="0"/>
-              <a:t>)</a:t>
-            </a:r>
-          </a:p>
-          <a:p>
-            <a:pPr lvl="1"/>
-            <a:endParaRPr lang="de-DE" dirty="0"/>
-          </a:p>
-          <a:p>
-            <a:r>
-              <a:rPr lang="de-DE" dirty="0"/>
-              <a:t>Constant vs. </a:t>
-            </a:r>
-            <a:r>
-              <a:rPr lang="de-DE" dirty="0" err="1"/>
-              <a:t>random</a:t>
-            </a:r>
-            <a:r>
-              <a:rPr lang="de-DE" dirty="0"/>
-              <a:t> 2:</a:t>
-            </a:r>
-          </a:p>
-          <a:p>
-            <a:pPr lvl="1"/>
-            <a:r>
-              <a:rPr lang="de-DE" b="1" dirty="0" err="1"/>
-              <a:t>Significant</a:t>
-            </a:r>
-            <a:r>
-              <a:rPr lang="de-DE" dirty="0"/>
-              <a:t> </a:t>
-            </a:r>
-            <a:r>
-              <a:rPr lang="de-DE" dirty="0" err="1"/>
-              <a:t>difference</a:t>
-            </a:r>
-            <a:r>
-              <a:rPr lang="de-DE" dirty="0"/>
-              <a:t> in </a:t>
-            </a:r>
-            <a:r>
-              <a:rPr lang="de-DE" dirty="0" err="1"/>
-              <a:t>theta</a:t>
-            </a:r>
-            <a:r>
-              <a:rPr lang="de-DE" dirty="0"/>
-              <a:t> band:  1 </a:t>
-            </a:r>
-            <a:r>
-              <a:rPr lang="de-DE" dirty="0" err="1"/>
-              <a:t>pos</a:t>
-            </a:r>
-            <a:r>
-              <a:rPr lang="de-DE" dirty="0"/>
-              <a:t> </a:t>
-            </a:r>
-            <a:r>
-              <a:rPr lang="de-DE" dirty="0" err="1"/>
-              <a:t>cluster</a:t>
-            </a:r>
-            <a:r>
-              <a:rPr lang="de-DE" dirty="0"/>
-              <a:t> (</a:t>
-            </a:r>
-            <a:r>
-              <a:rPr lang="de-DE" dirty="0" err="1"/>
-              <a:t>sig</a:t>
-            </a:r>
-            <a:r>
-              <a:rPr lang="de-DE" dirty="0"/>
-              <a:t>)</a:t>
-            </a:r>
-          </a:p>
-          <a:p>
-            <a:pPr lvl="1"/>
-            <a:r>
-              <a:rPr lang="de-DE" b="1" dirty="0" err="1"/>
-              <a:t>Significant</a:t>
-            </a:r>
-            <a:r>
-              <a:rPr lang="de-DE" dirty="0"/>
-              <a:t> </a:t>
-            </a:r>
-            <a:r>
-              <a:rPr lang="de-DE" dirty="0" err="1"/>
-              <a:t>difference</a:t>
-            </a:r>
-            <a:r>
-              <a:rPr lang="de-DE" dirty="0"/>
-              <a:t> in </a:t>
-            </a:r>
-            <a:r>
-              <a:rPr lang="de-DE" dirty="0" err="1"/>
-              <a:t>alpha</a:t>
-            </a:r>
-            <a:r>
-              <a:rPr lang="de-DE" dirty="0"/>
-              <a:t> band: 1 </a:t>
-            </a:r>
-            <a:r>
-              <a:rPr lang="de-DE" dirty="0" err="1"/>
-              <a:t>pos</a:t>
-            </a:r>
-            <a:r>
-              <a:rPr lang="de-DE" dirty="0"/>
-              <a:t> </a:t>
-            </a:r>
-            <a:r>
-              <a:rPr lang="de-DE" dirty="0" err="1"/>
-              <a:t>cluster</a:t>
-            </a:r>
-            <a:r>
-              <a:rPr lang="de-DE" dirty="0"/>
-              <a:t> (</a:t>
-            </a:r>
-            <a:r>
-              <a:rPr lang="de-DE" dirty="0" err="1"/>
-              <a:t>sig</a:t>
-            </a:r>
-            <a:r>
-              <a:rPr lang="de-DE" dirty="0"/>
-              <a:t>), </a:t>
-            </a:r>
-          </a:p>
-          <a:p>
-            <a:pPr marL="0" indent="0">
-              <a:buNone/>
-            </a:pPr>
-            <a:endParaRPr lang="de-DE" dirty="0"/>
-          </a:p>
-          <a:p>
-            <a:r>
-              <a:rPr lang="de-DE" dirty="0"/>
-              <a:t>Random 1 vs. </a:t>
-            </a:r>
-            <a:r>
-              <a:rPr lang="de-DE" dirty="0" err="1"/>
-              <a:t>random</a:t>
-            </a:r>
-            <a:r>
-              <a:rPr lang="de-DE" dirty="0"/>
-              <a:t> 2:</a:t>
-            </a:r>
-          </a:p>
-          <a:p>
-            <a:pPr lvl="1"/>
-            <a:r>
-              <a:rPr lang="de-DE" dirty="0" err="1"/>
-              <a:t>No</a:t>
-            </a:r>
-            <a:r>
-              <a:rPr lang="de-DE" dirty="0"/>
-              <a:t> </a:t>
-            </a:r>
-            <a:r>
-              <a:rPr lang="de-DE" dirty="0" err="1"/>
-              <a:t>significant</a:t>
-            </a:r>
-            <a:r>
-              <a:rPr lang="de-DE" dirty="0"/>
-              <a:t> </a:t>
-            </a:r>
-            <a:r>
-              <a:rPr lang="de-DE" dirty="0" err="1"/>
-              <a:t>difference</a:t>
-            </a:r>
-            <a:r>
-              <a:rPr lang="de-DE" dirty="0"/>
-              <a:t> in </a:t>
-            </a:r>
-            <a:r>
-              <a:rPr lang="de-DE" dirty="0" err="1"/>
-              <a:t>theta</a:t>
-            </a:r>
-            <a:r>
-              <a:rPr lang="de-DE" dirty="0"/>
-              <a:t> band</a:t>
-            </a:r>
-          </a:p>
-          <a:p>
-            <a:pPr lvl="1"/>
-            <a:r>
-              <a:rPr lang="de-DE" dirty="0" err="1"/>
-              <a:t>No</a:t>
-            </a:r>
-            <a:r>
-              <a:rPr lang="de-DE" dirty="0"/>
-              <a:t> </a:t>
-            </a:r>
-            <a:r>
-              <a:rPr lang="de-DE" dirty="0" err="1"/>
-              <a:t>significant</a:t>
-            </a:r>
-            <a:r>
-              <a:rPr lang="de-DE" dirty="0"/>
-              <a:t> </a:t>
-            </a:r>
-            <a:r>
-              <a:rPr lang="de-DE" dirty="0" err="1"/>
-              <a:t>difference</a:t>
-            </a:r>
-            <a:r>
-              <a:rPr lang="de-DE" dirty="0"/>
-              <a:t> in </a:t>
-            </a:r>
-            <a:r>
-              <a:rPr lang="de-DE" dirty="0" err="1"/>
-              <a:t>alpha</a:t>
-            </a:r>
-            <a:r>
-              <a:rPr lang="de-DE" dirty="0"/>
-              <a:t> band</a:t>
-            </a:r>
-          </a:p>
-          <a:p>
-            <a:pPr lvl="1"/>
-            <a:endParaRPr lang="de-DE" dirty="0"/>
-          </a:p>
-          <a:p>
-            <a:pPr lvl="1"/>
-            <a:endParaRPr lang="de-DE" dirty="0"/>
-          </a:p>
-        </p:txBody>
-      </p:sp>
-      <p:sp>
-        <p:nvSpPr>
-          <p:cNvPr id="4" name="Textfeld 3">
-            <a:extLst>
-              <a:ext uri="{FF2B5EF4-FFF2-40B4-BE49-F238E27FC236}">
-                <a16:creationId xmlns:a16="http://schemas.microsoft.com/office/drawing/2014/main" id="{03C9F29E-3A36-4D0A-A0FD-B3682B44BF8A}"/>
-              </a:ext>
-            </a:extLst>
-          </p:cNvPr>
-          <p:cNvSpPr txBox="1"/>
+              <a:rPr lang="de-DE" dirty="0" err="1"/>
+              <a:t>Difference</a:t>
+            </a:r>
+            <a:r>
+              <a:rPr lang="de-DE" dirty="0"/>
+              <a:t>: </a:t>
+            </a:r>
+            <a:r>
+              <a:rPr lang="de-DE" dirty="0" err="1"/>
+              <a:t>constant</a:t>
+            </a:r>
+            <a:r>
+              <a:rPr lang="de-DE" dirty="0"/>
+              <a:t> – rand2</a:t>
+            </a:r>
+          </a:p>
+        </p:txBody>
+      </p:sp>
+      <p:pic>
+        <p:nvPicPr>
+          <p:cNvPr id="4" name="Grafik 3">
+            <a:extLst>
+              <a:ext uri="{FF2B5EF4-FFF2-40B4-BE49-F238E27FC236}">
+                <a16:creationId xmlns:a16="http://schemas.microsoft.com/office/drawing/2014/main" id="{2C3E4D40-1B67-4BA8-A964-D688DAAC6056}"/>
+              </a:ext>
+            </a:extLst>
+          </p:cNvPr>
+          <p:cNvPicPr>
+            <a:picLocks noChangeAspect="1"/>
+          </p:cNvPicPr>
           <p:nvPr/>
-        </p:nvSpPr>
+        </p:nvPicPr>
+        <p:blipFill>
+          <a:blip r:embed="rId2"/>
+          <a:stretch>
+            <a:fillRect/>
+          </a:stretch>
+        </p:blipFill>
         <p:spPr>
           <a:xfrm>
-            <a:off x="9305365" y="59172"/>
-            <a:ext cx="2635623" cy="646331"/>
+            <a:off x="479612" y="1404423"/>
+            <a:ext cx="6907306" cy="5283640"/>
           </a:xfrm>
           <a:prstGeom prst="rect">
             <a:avLst/>
           </a:prstGeom>
+        </p:spPr>
+      </p:pic>
+      <p:pic>
+        <p:nvPicPr>
+          <p:cNvPr id="5" name="Grafik 4">
+            <a:extLst>
+              <a:ext uri="{FF2B5EF4-FFF2-40B4-BE49-F238E27FC236}">
+                <a16:creationId xmlns:a16="http://schemas.microsoft.com/office/drawing/2014/main" id="{B78FED02-A17C-49FB-8644-0357C6E4F048}"/>
+              </a:ext>
+            </a:extLst>
+          </p:cNvPr>
+          <p:cNvPicPr>
+            <a:picLocks noChangeAspect="1"/>
+          </p:cNvPicPr>
+          <p:nvPr/>
+        </p:nvPicPr>
+        <p:blipFill>
+          <a:blip r:embed="rId3"/>
+          <a:stretch>
+            <a:fillRect/>
+          </a:stretch>
+        </p:blipFill>
+        <p:spPr>
+          <a:xfrm>
+            <a:off x="7758953" y="1027906"/>
+            <a:ext cx="3245223" cy="2708937"/>
+          </a:xfrm>
+          <a:prstGeom prst="rect">
+            <a:avLst/>
+          </a:prstGeom>
+        </p:spPr>
+      </p:pic>
+      <p:pic>
+        <p:nvPicPr>
+          <p:cNvPr id="6" name="Grafik 5">
+            <a:extLst>
+              <a:ext uri="{FF2B5EF4-FFF2-40B4-BE49-F238E27FC236}">
+                <a16:creationId xmlns:a16="http://schemas.microsoft.com/office/drawing/2014/main" id="{4F9D5D04-9E91-4C6B-846A-C7B98893A738}"/>
+              </a:ext>
+            </a:extLst>
+          </p:cNvPr>
+          <p:cNvPicPr>
+            <a:picLocks noChangeAspect="1"/>
+          </p:cNvPicPr>
+          <p:nvPr/>
+        </p:nvPicPr>
+        <p:blipFill>
+          <a:blip r:embed="rId4"/>
+          <a:stretch>
+            <a:fillRect/>
+          </a:stretch>
+        </p:blipFill>
+        <p:spPr>
+          <a:xfrm>
+            <a:off x="7860969" y="3925923"/>
+            <a:ext cx="3143207" cy="2566952"/>
+          </a:xfrm>
+          <a:prstGeom prst="rect">
+            <a:avLst/>
+          </a:prstGeom>
+        </p:spPr>
+      </p:pic>
+      <p:sp>
+        <p:nvSpPr>
+          <p:cNvPr id="7" name="Rechteck: abgerundete Ecken 6">
+            <a:extLst>
+              <a:ext uri="{FF2B5EF4-FFF2-40B4-BE49-F238E27FC236}">
+                <a16:creationId xmlns:a16="http://schemas.microsoft.com/office/drawing/2014/main" id="{E6DFB4B0-B3E9-48BA-9D9E-8246070CAA26}"/>
+              </a:ext>
+            </a:extLst>
+          </p:cNvPr>
+          <p:cNvSpPr/>
+          <p:nvPr/>
+        </p:nvSpPr>
+        <p:spPr>
+          <a:xfrm>
+            <a:off x="2850775" y="1606970"/>
+            <a:ext cx="1792943" cy="1185946"/>
+          </a:xfrm>
+          <a:prstGeom prst="roundRect">
+            <a:avLst>
+              <a:gd name="adj" fmla="val 0"/>
+            </a:avLst>
+          </a:prstGeom>
           <a:noFill/>
+          <a:ln w="28575">
+            <a:solidFill>
+              <a:srgbClr val="00B050"/>
+            </a:solidFill>
+          </a:ln>
         </p:spPr>
-        <p:txBody>
-          <a:bodyPr wrap="square" rtlCol="0">
-            <a:spAutoFit/>
-          </a:bodyPr>
-          <a:lstStyle/>
-          <a:p>
-            <a:r>
-              <a:rPr lang="de-DE" dirty="0"/>
-              <a:t>Cluster </a:t>
-            </a:r>
-            <a:r>
-              <a:rPr lang="de-DE" dirty="0" err="1"/>
-              <a:t>alpha</a:t>
-            </a:r>
-            <a:r>
-              <a:rPr lang="de-DE" dirty="0"/>
-              <a:t> = 0.001</a:t>
-            </a:r>
-          </a:p>
-          <a:p>
-            <a:r>
-              <a:rPr lang="de-DE" dirty="0"/>
-              <a:t>Alpha = 0.001</a:t>
-            </a:r>
+        <p:style>
+          <a:lnRef idx="2">
+            <a:schemeClr val="accent6"/>
+          </a:lnRef>
+          <a:fillRef idx="1">
+            <a:schemeClr val="lt1"/>
+          </a:fillRef>
+          <a:effectRef idx="0">
+            <a:schemeClr val="accent6"/>
+          </a:effectRef>
+          <a:fontRef idx="minor">
+            <a:schemeClr val="dk1"/>
+          </a:fontRef>
+        </p:style>
+        <p:txBody>
+          <a:bodyPr rtlCol="0" anchor="ctr"/>
+          <a:lstStyle/>
+          <a:p>
+            <a:pPr algn="ctr"/>
+            <a:endParaRPr lang="de-DE"/>
+          </a:p>
+        </p:txBody>
+      </p:sp>
+      <p:sp>
+        <p:nvSpPr>
+          <p:cNvPr id="8" name="Rechteck: abgerundete Ecken 7">
+            <a:extLst>
+              <a:ext uri="{FF2B5EF4-FFF2-40B4-BE49-F238E27FC236}">
+                <a16:creationId xmlns:a16="http://schemas.microsoft.com/office/drawing/2014/main" id="{A931BC8D-A70C-4828-AB81-64370CED5761}"/>
+              </a:ext>
+            </a:extLst>
+          </p:cNvPr>
+          <p:cNvSpPr/>
+          <p:nvPr/>
+        </p:nvSpPr>
+        <p:spPr>
+          <a:xfrm>
+            <a:off x="2152316" y="4922090"/>
+            <a:ext cx="3046427" cy="1427350"/>
+          </a:xfrm>
+          <a:prstGeom prst="roundRect">
+            <a:avLst>
+              <a:gd name="adj" fmla="val 0"/>
+            </a:avLst>
+          </a:prstGeom>
+          <a:noFill/>
+          <a:ln w="28575">
+            <a:solidFill>
+              <a:srgbClr val="7030A0"/>
+            </a:solidFill>
+          </a:ln>
+        </p:spPr>
+        <p:style>
+          <a:lnRef idx="2">
+            <a:schemeClr val="accent6"/>
+          </a:lnRef>
+          <a:fillRef idx="1">
+            <a:schemeClr val="lt1"/>
+          </a:fillRef>
+          <a:effectRef idx="0">
+            <a:schemeClr val="accent6"/>
+          </a:effectRef>
+          <a:fontRef idx="minor">
+            <a:schemeClr val="dk1"/>
+          </a:fontRef>
+        </p:style>
+        <p:txBody>
+          <a:bodyPr rtlCol="0" anchor="ctr"/>
+          <a:lstStyle/>
+          <a:p>
+            <a:pPr algn="ctr"/>
+            <a:endParaRPr lang="de-DE"/>
+          </a:p>
+        </p:txBody>
+      </p:sp>
+      <p:sp>
+        <p:nvSpPr>
+          <p:cNvPr id="9" name="Rechteck: abgerundete Ecken 8">
+            <a:extLst>
+              <a:ext uri="{FF2B5EF4-FFF2-40B4-BE49-F238E27FC236}">
+                <a16:creationId xmlns:a16="http://schemas.microsoft.com/office/drawing/2014/main" id="{3CAB1BE3-78FB-4E72-9ADA-67AD0391E222}"/>
+              </a:ext>
+            </a:extLst>
+          </p:cNvPr>
+          <p:cNvSpPr/>
+          <p:nvPr/>
+        </p:nvSpPr>
+        <p:spPr>
+          <a:xfrm>
+            <a:off x="7723096" y="3827777"/>
+            <a:ext cx="3446928" cy="2860285"/>
+          </a:xfrm>
+          <a:prstGeom prst="roundRect">
+            <a:avLst>
+              <a:gd name="adj" fmla="val 0"/>
+            </a:avLst>
+          </a:prstGeom>
+          <a:noFill/>
+          <a:ln w="28575">
+            <a:solidFill>
+              <a:srgbClr val="7030A0"/>
+            </a:solidFill>
+          </a:ln>
+        </p:spPr>
+        <p:style>
+          <a:lnRef idx="2">
+            <a:schemeClr val="accent6"/>
+          </a:lnRef>
+          <a:fillRef idx="1">
+            <a:schemeClr val="lt1"/>
+          </a:fillRef>
+          <a:effectRef idx="0">
+            <a:schemeClr val="accent6"/>
+          </a:effectRef>
+          <a:fontRef idx="minor">
+            <a:schemeClr val="dk1"/>
+          </a:fontRef>
+        </p:style>
+        <p:txBody>
+          <a:bodyPr rtlCol="0" anchor="ctr"/>
+          <a:lstStyle/>
+          <a:p>
+            <a:pPr algn="ctr"/>
+            <a:endParaRPr lang="de-DE"/>
+          </a:p>
+        </p:txBody>
+      </p:sp>
+      <p:sp>
+        <p:nvSpPr>
+          <p:cNvPr id="10" name="Rechteck: abgerundete Ecken 9">
+            <a:extLst>
+              <a:ext uri="{FF2B5EF4-FFF2-40B4-BE49-F238E27FC236}">
+                <a16:creationId xmlns:a16="http://schemas.microsoft.com/office/drawing/2014/main" id="{5EE2C4F0-D747-4C39-A216-542380EC0ADB}"/>
+              </a:ext>
+            </a:extLst>
+          </p:cNvPr>
+          <p:cNvSpPr/>
+          <p:nvPr/>
+        </p:nvSpPr>
+        <p:spPr>
+          <a:xfrm>
+            <a:off x="7678268" y="947602"/>
+            <a:ext cx="3491755" cy="2860285"/>
+          </a:xfrm>
+          <a:prstGeom prst="roundRect">
+            <a:avLst>
+              <a:gd name="adj" fmla="val 0"/>
+            </a:avLst>
+          </a:prstGeom>
+          <a:noFill/>
+          <a:ln w="28575">
+            <a:solidFill>
+              <a:srgbClr val="00B050"/>
+            </a:solidFill>
+          </a:ln>
+        </p:spPr>
+        <p:style>
+          <a:lnRef idx="2">
+            <a:schemeClr val="accent6"/>
+          </a:lnRef>
+          <a:fillRef idx="1">
+            <a:schemeClr val="lt1"/>
+          </a:fillRef>
+          <a:effectRef idx="0">
+            <a:schemeClr val="accent6"/>
+          </a:effectRef>
+          <a:fontRef idx="minor">
+            <a:schemeClr val="dk1"/>
+          </a:fontRef>
+        </p:style>
+        <p:txBody>
+          <a:bodyPr rtlCol="0" anchor="ctr"/>
+          <a:lstStyle/>
+          <a:p>
+            <a:pPr algn="ctr"/>
+            <a:endParaRPr lang="de-DE"/>
           </a:p>
         </p:txBody>
       </p:sp>
     </p:spTree>
     <p:extLst>
       <p:ext uri="{BB962C8B-B14F-4D97-AF65-F5344CB8AC3E}">
-        <p14:creationId xmlns:p14="http://schemas.microsoft.com/office/powerpoint/2010/main" val="2604605576"/>
+        <p14:creationId xmlns:p14="http://schemas.microsoft.com/office/powerpoint/2010/main" val="3885605744"/>
       </p:ext>
     </p:extLst>
   </p:cSld>
@@ -3912,6 +3808,479 @@
           <p:cNvPr id="2" name="Titel 1">
             <a:extLst>
               <a:ext uri="{FF2B5EF4-FFF2-40B4-BE49-F238E27FC236}">
+                <a16:creationId xmlns:a16="http://schemas.microsoft.com/office/drawing/2014/main" id="{E8D505D1-C9ED-45EB-ABF9-12C67A397336}"/>
+              </a:ext>
+            </a:extLst>
+          </p:cNvPr>
+          <p:cNvSpPr>
+            <a:spLocks noGrp="1"/>
+          </p:cNvSpPr>
+          <p:nvPr>
+            <p:ph type="title"/>
+          </p:nvPr>
+        </p:nvSpPr>
+        <p:spPr/>
+        <p:txBody>
+          <a:bodyPr/>
+          <a:lstStyle/>
+          <a:p>
+            <a:r>
+              <a:rPr lang="de-DE" dirty="0"/>
+              <a:t>Cluster-</a:t>
+            </a:r>
+            <a:r>
+              <a:rPr lang="de-DE" dirty="0" err="1"/>
+              <a:t>based</a:t>
+            </a:r>
+            <a:r>
+              <a:rPr lang="de-DE" dirty="0"/>
+              <a:t> </a:t>
+            </a:r>
+            <a:r>
+              <a:rPr lang="de-DE" dirty="0" err="1"/>
+              <a:t>permutation</a:t>
+            </a:r>
+            <a:r>
+              <a:rPr lang="de-DE" dirty="0"/>
+              <a:t> </a:t>
+            </a:r>
+            <a:r>
+              <a:rPr lang="de-DE" dirty="0" err="1"/>
+              <a:t>test</a:t>
+            </a:r>
+            <a:r>
+              <a:rPr lang="de-DE" dirty="0"/>
+              <a:t>: Task A</a:t>
+            </a:r>
+          </a:p>
+        </p:txBody>
+      </p:sp>
+      <p:sp>
+        <p:nvSpPr>
+          <p:cNvPr id="3" name="Inhaltsplatzhalter 2">
+            <a:extLst>
+              <a:ext uri="{FF2B5EF4-FFF2-40B4-BE49-F238E27FC236}">
+                <a16:creationId xmlns:a16="http://schemas.microsoft.com/office/drawing/2014/main" id="{F44E030C-11C5-472B-900D-BC76B88397E0}"/>
+              </a:ext>
+            </a:extLst>
+          </p:cNvPr>
+          <p:cNvSpPr>
+            <a:spLocks noGrp="1"/>
+          </p:cNvSpPr>
+          <p:nvPr>
+            <p:ph idx="1"/>
+          </p:nvPr>
+        </p:nvSpPr>
+        <p:spPr/>
+        <p:txBody>
+          <a:bodyPr>
+            <a:normAutofit lnSpcReduction="10000"/>
+          </a:bodyPr>
+          <a:lstStyle/>
+          <a:p>
+            <a:r>
+              <a:rPr lang="de-DE" dirty="0"/>
+              <a:t>Constant vs. </a:t>
+            </a:r>
+            <a:r>
+              <a:rPr lang="de-DE" dirty="0" err="1"/>
+              <a:t>random</a:t>
+            </a:r>
+            <a:r>
+              <a:rPr lang="de-DE" dirty="0"/>
+              <a:t> 1:</a:t>
+            </a:r>
+          </a:p>
+          <a:p>
+            <a:pPr lvl="1"/>
+            <a:r>
+              <a:rPr lang="de-DE" b="1" dirty="0" err="1"/>
+              <a:t>Significant</a:t>
+            </a:r>
+            <a:r>
+              <a:rPr lang="de-DE" dirty="0"/>
+              <a:t> </a:t>
+            </a:r>
+            <a:r>
+              <a:rPr lang="de-DE" dirty="0" err="1"/>
+              <a:t>difference</a:t>
+            </a:r>
+            <a:r>
+              <a:rPr lang="de-DE" dirty="0"/>
+              <a:t> in </a:t>
+            </a:r>
+            <a:r>
+              <a:rPr lang="de-DE" dirty="0" err="1"/>
+              <a:t>theta</a:t>
+            </a:r>
+            <a:r>
+              <a:rPr lang="de-DE" dirty="0"/>
+              <a:t> band: 5 negative </a:t>
+            </a:r>
+            <a:r>
+              <a:rPr lang="de-DE" dirty="0" err="1"/>
+              <a:t>clusters</a:t>
+            </a:r>
+            <a:r>
+              <a:rPr lang="de-DE" dirty="0"/>
+              <a:t> (</a:t>
+            </a:r>
+            <a:r>
+              <a:rPr lang="de-DE" dirty="0" err="1"/>
+              <a:t>sig</a:t>
+            </a:r>
+            <a:r>
+              <a:rPr lang="de-DE" dirty="0"/>
+              <a:t>)</a:t>
+            </a:r>
+          </a:p>
+          <a:p>
+            <a:pPr lvl="1"/>
+            <a:r>
+              <a:rPr lang="de-DE" b="1" dirty="0" err="1"/>
+              <a:t>Significant</a:t>
+            </a:r>
+            <a:r>
+              <a:rPr lang="de-DE" b="1" dirty="0"/>
+              <a:t> </a:t>
+            </a:r>
+            <a:r>
+              <a:rPr lang="de-DE" dirty="0" err="1"/>
+              <a:t>difference</a:t>
+            </a:r>
+            <a:r>
+              <a:rPr lang="de-DE" dirty="0"/>
+              <a:t> in </a:t>
+            </a:r>
+            <a:r>
+              <a:rPr lang="de-DE" dirty="0" err="1"/>
+              <a:t>alpha</a:t>
+            </a:r>
+            <a:r>
+              <a:rPr lang="de-DE" dirty="0"/>
+              <a:t> band: 9 negative </a:t>
+            </a:r>
+            <a:r>
+              <a:rPr lang="de-DE" dirty="0" err="1"/>
+              <a:t>clusters</a:t>
+            </a:r>
+            <a:r>
+              <a:rPr lang="de-DE" dirty="0"/>
+              <a:t> (</a:t>
+            </a:r>
+            <a:r>
+              <a:rPr lang="de-DE" dirty="0" err="1"/>
+              <a:t>sig</a:t>
+            </a:r>
+            <a:r>
+              <a:rPr lang="de-DE" dirty="0"/>
+              <a:t>)</a:t>
+            </a:r>
+          </a:p>
+          <a:p>
+            <a:pPr lvl="1"/>
+            <a:endParaRPr lang="de-DE" dirty="0"/>
+          </a:p>
+          <a:p>
+            <a:r>
+              <a:rPr lang="de-DE" dirty="0"/>
+              <a:t>Constant vs. </a:t>
+            </a:r>
+            <a:r>
+              <a:rPr lang="de-DE" dirty="0" err="1"/>
+              <a:t>random</a:t>
+            </a:r>
+            <a:r>
+              <a:rPr lang="de-DE" dirty="0"/>
+              <a:t> 2:</a:t>
+            </a:r>
+          </a:p>
+          <a:p>
+            <a:pPr lvl="1"/>
+            <a:r>
+              <a:rPr lang="de-DE" b="1" dirty="0" err="1"/>
+              <a:t>Significant</a:t>
+            </a:r>
+            <a:r>
+              <a:rPr lang="de-DE" dirty="0"/>
+              <a:t> </a:t>
+            </a:r>
+            <a:r>
+              <a:rPr lang="de-DE" dirty="0" err="1"/>
+              <a:t>difference</a:t>
+            </a:r>
+            <a:r>
+              <a:rPr lang="de-DE" dirty="0"/>
+              <a:t> in </a:t>
+            </a:r>
+            <a:r>
+              <a:rPr lang="de-DE" dirty="0" err="1"/>
+              <a:t>theta</a:t>
+            </a:r>
+            <a:r>
+              <a:rPr lang="de-DE" dirty="0"/>
+              <a:t> band:  1 </a:t>
+            </a:r>
+            <a:r>
+              <a:rPr lang="de-DE" dirty="0" err="1"/>
+              <a:t>pos</a:t>
+            </a:r>
+            <a:r>
+              <a:rPr lang="de-DE" dirty="0"/>
+              <a:t> </a:t>
+            </a:r>
+            <a:r>
+              <a:rPr lang="de-DE" dirty="0" err="1"/>
+              <a:t>cluster</a:t>
+            </a:r>
+            <a:r>
+              <a:rPr lang="de-DE" dirty="0"/>
+              <a:t> (</a:t>
+            </a:r>
+            <a:r>
+              <a:rPr lang="de-DE" dirty="0" err="1"/>
+              <a:t>sig</a:t>
+            </a:r>
+            <a:r>
+              <a:rPr lang="de-DE" dirty="0"/>
+              <a:t>)</a:t>
+            </a:r>
+          </a:p>
+          <a:p>
+            <a:pPr lvl="1"/>
+            <a:r>
+              <a:rPr lang="de-DE" b="1" dirty="0" err="1"/>
+              <a:t>Significant</a:t>
+            </a:r>
+            <a:r>
+              <a:rPr lang="de-DE" dirty="0"/>
+              <a:t> </a:t>
+            </a:r>
+            <a:r>
+              <a:rPr lang="de-DE" dirty="0" err="1"/>
+              <a:t>difference</a:t>
+            </a:r>
+            <a:r>
+              <a:rPr lang="de-DE" dirty="0"/>
+              <a:t> in </a:t>
+            </a:r>
+            <a:r>
+              <a:rPr lang="de-DE" dirty="0" err="1"/>
+              <a:t>alpha</a:t>
+            </a:r>
+            <a:r>
+              <a:rPr lang="de-DE" dirty="0"/>
+              <a:t> band: 1 </a:t>
+            </a:r>
+            <a:r>
+              <a:rPr lang="de-DE" dirty="0" err="1"/>
+              <a:t>pos</a:t>
+            </a:r>
+            <a:r>
+              <a:rPr lang="de-DE" dirty="0"/>
+              <a:t> </a:t>
+            </a:r>
+            <a:r>
+              <a:rPr lang="de-DE" dirty="0" err="1"/>
+              <a:t>cluster</a:t>
+            </a:r>
+            <a:r>
+              <a:rPr lang="de-DE" dirty="0"/>
+              <a:t> (</a:t>
+            </a:r>
+            <a:r>
+              <a:rPr lang="de-DE" dirty="0" err="1"/>
+              <a:t>sig</a:t>
+            </a:r>
+            <a:r>
+              <a:rPr lang="de-DE" dirty="0"/>
+              <a:t>), </a:t>
+            </a:r>
+          </a:p>
+          <a:p>
+            <a:pPr marL="0" indent="0">
+              <a:buNone/>
+            </a:pPr>
+            <a:endParaRPr lang="de-DE" dirty="0"/>
+          </a:p>
+          <a:p>
+            <a:r>
+              <a:rPr lang="de-DE" dirty="0"/>
+              <a:t>Random 1 vs. </a:t>
+            </a:r>
+            <a:r>
+              <a:rPr lang="de-DE" dirty="0" err="1"/>
+              <a:t>random</a:t>
+            </a:r>
+            <a:r>
+              <a:rPr lang="de-DE" dirty="0"/>
+              <a:t> 2:</a:t>
+            </a:r>
+          </a:p>
+          <a:p>
+            <a:pPr lvl="1"/>
+            <a:r>
+              <a:rPr lang="de-DE" dirty="0" err="1"/>
+              <a:t>No</a:t>
+            </a:r>
+            <a:r>
+              <a:rPr lang="de-DE" dirty="0"/>
+              <a:t> </a:t>
+            </a:r>
+            <a:r>
+              <a:rPr lang="de-DE" dirty="0" err="1"/>
+              <a:t>significant</a:t>
+            </a:r>
+            <a:r>
+              <a:rPr lang="de-DE" dirty="0"/>
+              <a:t> </a:t>
+            </a:r>
+            <a:r>
+              <a:rPr lang="de-DE" dirty="0" err="1"/>
+              <a:t>difference</a:t>
+            </a:r>
+            <a:r>
+              <a:rPr lang="de-DE" dirty="0"/>
+              <a:t> in </a:t>
+            </a:r>
+            <a:r>
+              <a:rPr lang="de-DE" dirty="0" err="1"/>
+              <a:t>theta</a:t>
+            </a:r>
+            <a:r>
+              <a:rPr lang="de-DE" dirty="0"/>
+              <a:t> band</a:t>
+            </a:r>
+          </a:p>
+          <a:p>
+            <a:pPr lvl="1"/>
+            <a:r>
+              <a:rPr lang="de-DE" dirty="0" err="1"/>
+              <a:t>No</a:t>
+            </a:r>
+            <a:r>
+              <a:rPr lang="de-DE" dirty="0"/>
+              <a:t> </a:t>
+            </a:r>
+            <a:r>
+              <a:rPr lang="de-DE" dirty="0" err="1"/>
+              <a:t>significant</a:t>
+            </a:r>
+            <a:r>
+              <a:rPr lang="de-DE" dirty="0"/>
+              <a:t> </a:t>
+            </a:r>
+            <a:r>
+              <a:rPr lang="de-DE" dirty="0" err="1"/>
+              <a:t>difference</a:t>
+            </a:r>
+            <a:r>
+              <a:rPr lang="de-DE" dirty="0"/>
+              <a:t> in </a:t>
+            </a:r>
+            <a:r>
+              <a:rPr lang="de-DE" dirty="0" err="1"/>
+              <a:t>alpha</a:t>
+            </a:r>
+            <a:r>
+              <a:rPr lang="de-DE" dirty="0"/>
+              <a:t> band</a:t>
+            </a:r>
+          </a:p>
+          <a:p>
+            <a:pPr lvl="1"/>
+            <a:endParaRPr lang="de-DE" dirty="0"/>
+          </a:p>
+          <a:p>
+            <a:pPr lvl="1"/>
+            <a:endParaRPr lang="de-DE" dirty="0"/>
+          </a:p>
+        </p:txBody>
+      </p:sp>
+      <p:sp>
+        <p:nvSpPr>
+          <p:cNvPr id="4" name="Textfeld 3">
+            <a:extLst>
+              <a:ext uri="{FF2B5EF4-FFF2-40B4-BE49-F238E27FC236}">
+                <a16:creationId xmlns:a16="http://schemas.microsoft.com/office/drawing/2014/main" id="{03C9F29E-3A36-4D0A-A0FD-B3682B44BF8A}"/>
+              </a:ext>
+            </a:extLst>
+          </p:cNvPr>
+          <p:cNvSpPr txBox="1"/>
+          <p:nvPr/>
+        </p:nvSpPr>
+        <p:spPr>
+          <a:xfrm>
+            <a:off x="9305365" y="59172"/>
+            <a:ext cx="2635623" cy="646331"/>
+          </a:xfrm>
+          <a:prstGeom prst="rect">
+            <a:avLst/>
+          </a:prstGeom>
+          <a:noFill/>
+        </p:spPr>
+        <p:txBody>
+          <a:bodyPr wrap="square" rtlCol="0">
+            <a:spAutoFit/>
+          </a:bodyPr>
+          <a:lstStyle/>
+          <a:p>
+            <a:r>
+              <a:rPr lang="de-DE" dirty="0"/>
+              <a:t>Cluster </a:t>
+            </a:r>
+            <a:r>
+              <a:rPr lang="de-DE" dirty="0" err="1"/>
+              <a:t>alpha</a:t>
+            </a:r>
+            <a:r>
+              <a:rPr lang="de-DE" dirty="0"/>
+              <a:t> = 0.001</a:t>
+            </a:r>
+          </a:p>
+          <a:p>
+            <a:r>
+              <a:rPr lang="de-DE" dirty="0"/>
+              <a:t>Alpha = 0.001</a:t>
+            </a:r>
+          </a:p>
+        </p:txBody>
+      </p:sp>
+    </p:spTree>
+    <p:extLst>
+      <p:ext uri="{BB962C8B-B14F-4D97-AF65-F5344CB8AC3E}">
+        <p14:creationId xmlns:p14="http://schemas.microsoft.com/office/powerpoint/2010/main" val="2604605576"/>
+      </p:ext>
+    </p:extLst>
+  </p:cSld>
+  <p:clrMapOvr>
+    <a:masterClrMapping/>
+  </p:clrMapOvr>
+</p:sld>
+</file>
+
+<file path=ppt/slides/slide12.xml><?xml version="1.0" encoding="utf-8"?>
+<p:sld xmlns:a="http://schemas.openxmlformats.org/drawingml/2006/main" xmlns:r="http://schemas.openxmlformats.org/officeDocument/2006/relationships" xmlns:p="http://schemas.openxmlformats.org/presentationml/2006/main">
+  <p:cSld>
+    <p:spTree>
+      <p:nvGrpSpPr>
+        <p:cNvPr id="1" name=""/>
+        <p:cNvGrpSpPr/>
+        <p:nvPr/>
+      </p:nvGrpSpPr>
+      <p:grpSpPr>
+        <a:xfrm>
+          <a:off x="0" y="0"/>
+          <a:ext cx="0" cy="0"/>
+          <a:chOff x="0" y="0"/>
+          <a:chExt cx="0" cy="0"/>
+        </a:xfrm>
+      </p:grpSpPr>
+      <p:sp>
+        <p:nvSpPr>
+          <p:cNvPr id="2" name="Titel 1">
+            <a:extLst>
+              <a:ext uri="{FF2B5EF4-FFF2-40B4-BE49-F238E27FC236}">
                 <a16:creationId xmlns:a16="http://schemas.microsoft.com/office/drawing/2014/main" id="{924A9B55-F174-46F8-9A79-14F53C48787F}"/>
               </a:ext>
             </a:extLst>
@@ -4198,7 +4567,7 @@
 </p:sld>
 </file>
 
-<file path=ppt/slides/slide12.xml><?xml version="1.0" encoding="utf-8"?>
+<file path=ppt/slides/slide13.xml><?xml version="1.0" encoding="utf-8"?>
 <p:sld xmlns:a="http://schemas.openxmlformats.org/drawingml/2006/main" xmlns:r="http://schemas.openxmlformats.org/officeDocument/2006/relationships" xmlns:p="http://schemas.openxmlformats.org/presentationml/2006/main">
   <p:cSld>
     <p:spTree>
@@ -4503,7 +4872,7 @@
 </p:sld>
 </file>
 
-<file path=ppt/slides/slide13.xml><?xml version="1.0" encoding="utf-8"?>
+<file path=ppt/slides/slide14.xml><?xml version="1.0" encoding="utf-8"?>
 <p:sld xmlns:a="http://schemas.openxmlformats.org/drawingml/2006/main" xmlns:r="http://schemas.openxmlformats.org/officeDocument/2006/relationships" xmlns:p="http://schemas.openxmlformats.org/presentationml/2006/main">
   <p:cSld>
     <p:spTree>
@@ -4864,7 +5233,7 @@
 </p:sld>
 </file>
 
-<file path=ppt/slides/slide14.xml><?xml version="1.0" encoding="utf-8"?>
+<file path=ppt/slides/slide15.xml><?xml version="1.0" encoding="utf-8"?>
 <p:sld xmlns:a="http://schemas.openxmlformats.org/drawingml/2006/main" xmlns:r="http://schemas.openxmlformats.org/officeDocument/2006/relationships" xmlns:p="http://schemas.openxmlformats.org/presentationml/2006/main">
   <p:cSld>
     <p:spTree>
@@ -5098,7 +5467,7 @@
 </p:sld>
 </file>
 
-<file path=ppt/slides/slide15.xml><?xml version="1.0" encoding="utf-8"?>
+<file path=ppt/slides/slide16.xml><?xml version="1.0" encoding="utf-8"?>
 <p:sld xmlns:a="http://schemas.openxmlformats.org/drawingml/2006/main" xmlns:r="http://schemas.openxmlformats.org/officeDocument/2006/relationships" xmlns:p="http://schemas.openxmlformats.org/presentationml/2006/main">
   <p:cSld>
     <p:spTree>
@@ -5374,7 +5743,7 @@
           <p:cNvPr id="2" name="Titel 1">
             <a:extLst>
               <a:ext uri="{FF2B5EF4-FFF2-40B4-BE49-F238E27FC236}">
-                <a16:creationId xmlns:a16="http://schemas.microsoft.com/office/drawing/2014/main" id="{163CECCD-431A-4FD5-8B6C-F3E960ACADC1}"/>
+                <a16:creationId xmlns:a16="http://schemas.microsoft.com/office/drawing/2014/main" id="{D7D4862A-3324-427D-B519-95EF10B90CC9}"/>
               </a:ext>
             </a:extLst>
           </p:cNvPr>
@@ -5391,38 +5760,13 @@
           <a:lstStyle/>
           <a:p>
             <a:r>
-              <a:rPr lang="de-DE" dirty="0"/>
-              <a:t>Wavelet </a:t>
-            </a:r>
-            <a:r>
-              <a:rPr lang="de-DE" dirty="0" err="1"/>
-              <a:t>analysis</a:t>
-            </a:r>
-            <a:r>
-              <a:rPr lang="de-DE" dirty="0"/>
-              <a:t> &amp; cluster-</a:t>
-            </a:r>
-            <a:r>
-              <a:rPr lang="de-DE" dirty="0" err="1"/>
-              <a:t>based</a:t>
-            </a:r>
-            <a:r>
-              <a:rPr lang="de-DE" dirty="0"/>
-              <a:t> </a:t>
-            </a:r>
-            <a:r>
-              <a:rPr lang="de-DE" dirty="0" err="1"/>
-              <a:t>permutation</a:t>
-            </a:r>
-            <a:r>
-              <a:rPr lang="de-DE" dirty="0"/>
-              <a:t> </a:t>
-            </a:r>
-            <a:r>
-              <a:rPr lang="de-DE" dirty="0" err="1"/>
-              <a:t>test</a:t>
-            </a:r>
-            <a:endParaRPr lang="de-DE" dirty="0"/>
+              <a:rPr lang="de-DE" dirty="0" err="1"/>
+              <a:t>Preprocessing</a:t>
+            </a:r>
+            <a:r>
+              <a:rPr lang="de-DE" dirty="0"/>
+              <a:t> </a:t>
+            </a:r>
           </a:p>
         </p:txBody>
       </p:sp>
@@ -5431,7 +5775,7 @@
           <p:cNvPr id="3" name="Inhaltsplatzhalter 2">
             <a:extLst>
               <a:ext uri="{FF2B5EF4-FFF2-40B4-BE49-F238E27FC236}">
-                <a16:creationId xmlns:a16="http://schemas.microsoft.com/office/drawing/2014/main" id="{2362F52C-3AFD-412B-AEA5-964704AB3EC8}"/>
+                <a16:creationId xmlns:a16="http://schemas.microsoft.com/office/drawing/2014/main" id="{4DFACBA1-2886-4864-BE37-B12D6ECEF9F8}"/>
               </a:ext>
             </a:extLst>
           </p:cNvPr>
@@ -5444,28 +5788,277 @@
         </p:nvSpPr>
         <p:spPr/>
         <p:txBody>
-          <a:bodyPr/>
-          <a:lstStyle/>
-          <a:p>
-            <a:r>
-              <a:rPr lang="de-DE" dirty="0" err="1"/>
-              <a:t>Morlet</a:t>
-            </a:r>
-            <a:r>
-              <a:rPr lang="de-DE" dirty="0"/>
-              <a:t> </a:t>
-            </a:r>
-            <a:r>
-              <a:rPr lang="de-DE" dirty="0" err="1"/>
-              <a:t>wavelet</a:t>
-            </a:r>
-            <a:r>
-              <a:rPr lang="de-DE" dirty="0"/>
-              <a:t>: 5 </a:t>
-            </a:r>
-            <a:r>
-              <a:rPr lang="de-DE" dirty="0" err="1"/>
-              <a:t>cycles</a:t>
+          <a:bodyPr>
+            <a:normAutofit fontScale="55000" lnSpcReduction="20000"/>
+          </a:bodyPr>
+          <a:lstStyle/>
+          <a:p>
+            <a:r>
+              <a:rPr lang="de-DE" dirty="0" err="1"/>
+              <a:t>FPz</a:t>
+            </a:r>
+            <a:r>
+              <a:rPr lang="de-DE" dirty="0"/>
+              <a:t> </a:t>
+            </a:r>
+            <a:r>
+              <a:rPr lang="de-DE" dirty="0" err="1"/>
+              <a:t>as</a:t>
+            </a:r>
+            <a:r>
+              <a:rPr lang="de-DE" dirty="0"/>
+              <a:t> </a:t>
+            </a:r>
+            <a:r>
+              <a:rPr lang="de-DE" dirty="0" err="1"/>
+              <a:t>reference</a:t>
+            </a:r>
+            <a:r>
+              <a:rPr lang="de-DE" dirty="0"/>
+              <a:t> </a:t>
+            </a:r>
+            <a:r>
+              <a:rPr lang="de-DE" dirty="0" err="1"/>
+              <a:t>electrode</a:t>
+            </a:r>
+            <a:endParaRPr lang="de-DE" dirty="0"/>
+          </a:p>
+          <a:p>
+            <a:r>
+              <a:rPr lang="de-DE" dirty="0" err="1"/>
+              <a:t>Downsampling</a:t>
+            </a:r>
+            <a:r>
+              <a:rPr lang="de-DE" dirty="0"/>
+              <a:t> </a:t>
+            </a:r>
+            <a:r>
+              <a:rPr lang="de-DE" dirty="0" err="1"/>
+              <a:t>to</a:t>
+            </a:r>
+            <a:r>
+              <a:rPr lang="de-DE" dirty="0"/>
+              <a:t> 250 Hz</a:t>
+            </a:r>
+          </a:p>
+          <a:p>
+            <a:r>
+              <a:rPr lang="de-DE" dirty="0" err="1"/>
+              <a:t>Highpass</a:t>
+            </a:r>
+            <a:r>
+              <a:rPr lang="de-DE" dirty="0"/>
+              <a:t> </a:t>
+            </a:r>
+            <a:r>
+              <a:rPr lang="de-DE" dirty="0" err="1"/>
+              <a:t>filter</a:t>
+            </a:r>
+            <a:r>
+              <a:rPr lang="de-DE" dirty="0"/>
+              <a:t> </a:t>
+            </a:r>
+            <a:r>
+              <a:rPr lang="de-DE" dirty="0" err="1"/>
+              <a:t>for</a:t>
+            </a:r>
+            <a:r>
+              <a:rPr lang="de-DE" dirty="0"/>
+              <a:t> </a:t>
+            </a:r>
+            <a:r>
+              <a:rPr lang="de-DE" dirty="0">
+                <a:highlight>
+                  <a:srgbClr val="FFFF00"/>
+                </a:highlight>
+              </a:rPr>
+              <a:t>1 Hz</a:t>
+            </a:r>
+          </a:p>
+          <a:p>
+            <a:r>
+              <a:rPr lang="de-DE" dirty="0"/>
+              <a:t>Remove </a:t>
+            </a:r>
+            <a:r>
+              <a:rPr lang="de-DE" dirty="0" err="1"/>
+              <a:t>line</a:t>
+            </a:r>
+            <a:r>
+              <a:rPr lang="de-DE" dirty="0"/>
+              <a:t> </a:t>
+            </a:r>
+            <a:r>
+              <a:rPr lang="de-DE" dirty="0" err="1"/>
+              <a:t>noise</a:t>
+            </a:r>
+            <a:r>
+              <a:rPr lang="de-DE" dirty="0"/>
+              <a:t> at 50 Hz</a:t>
+            </a:r>
+          </a:p>
+          <a:p>
+            <a:r>
+              <a:rPr lang="de-DE" dirty="0"/>
+              <a:t>Remove </a:t>
+            </a:r>
+            <a:r>
+              <a:rPr lang="de-DE" dirty="0" err="1"/>
+              <a:t>bad</a:t>
+            </a:r>
+            <a:r>
+              <a:rPr lang="de-DE" dirty="0"/>
+              <a:t> </a:t>
+            </a:r>
+            <a:r>
+              <a:rPr lang="de-DE" dirty="0" err="1"/>
+              <a:t>channels</a:t>
+            </a:r>
+            <a:r>
+              <a:rPr lang="de-DE" dirty="0"/>
+              <a:t> (flat, </a:t>
+            </a:r>
+            <a:r>
+              <a:rPr lang="de-DE" dirty="0" err="1"/>
+              <a:t>minimum</a:t>
+            </a:r>
+            <a:r>
+              <a:rPr lang="de-DE" dirty="0"/>
+              <a:t> </a:t>
+            </a:r>
+            <a:r>
+              <a:rPr lang="de-DE" dirty="0" err="1"/>
+              <a:t>channel</a:t>
+            </a:r>
+            <a:r>
+              <a:rPr lang="de-DE" dirty="0"/>
+              <a:t> </a:t>
+            </a:r>
+            <a:r>
+              <a:rPr lang="de-DE" dirty="0" err="1"/>
+              <a:t>correlation</a:t>
+            </a:r>
+            <a:r>
+              <a:rPr lang="de-DE" dirty="0"/>
+              <a:t>)</a:t>
+            </a:r>
+          </a:p>
+          <a:p>
+            <a:r>
+              <a:rPr lang="de-DE" dirty="0" err="1"/>
+              <a:t>Lowpass</a:t>
+            </a:r>
+            <a:r>
+              <a:rPr lang="de-DE" dirty="0"/>
+              <a:t> </a:t>
+            </a:r>
+            <a:r>
+              <a:rPr lang="de-DE" dirty="0" err="1"/>
+              <a:t>filter</a:t>
+            </a:r>
+            <a:r>
+              <a:rPr lang="de-DE" dirty="0"/>
+              <a:t> 40 Hz</a:t>
+            </a:r>
+          </a:p>
+          <a:p>
+            <a:r>
+              <a:rPr lang="de-DE" dirty="0" err="1"/>
+              <a:t>Interpolate</a:t>
+            </a:r>
+            <a:r>
+              <a:rPr lang="de-DE" dirty="0"/>
+              <a:t> </a:t>
+            </a:r>
+            <a:r>
+              <a:rPr lang="de-DE" dirty="0" err="1"/>
+              <a:t>bad</a:t>
+            </a:r>
+            <a:r>
+              <a:rPr lang="de-DE" dirty="0"/>
+              <a:t> </a:t>
+            </a:r>
+            <a:r>
+              <a:rPr lang="de-DE" dirty="0" err="1"/>
+              <a:t>channels</a:t>
+            </a:r>
+            <a:endParaRPr lang="de-DE" dirty="0"/>
+          </a:p>
+          <a:p>
+            <a:r>
+              <a:rPr lang="de-DE" dirty="0" err="1"/>
+              <a:t>Rereference</a:t>
+            </a:r>
+            <a:r>
+              <a:rPr lang="de-DE" dirty="0"/>
+              <a:t> </a:t>
+            </a:r>
+            <a:r>
+              <a:rPr lang="de-DE" dirty="0" err="1"/>
+              <a:t>to</a:t>
+            </a:r>
+            <a:r>
+              <a:rPr lang="de-DE" dirty="0"/>
+              <a:t> </a:t>
+            </a:r>
+            <a:r>
+              <a:rPr lang="de-DE" dirty="0" err="1"/>
+              <a:t>average</a:t>
+            </a:r>
+            <a:endParaRPr lang="de-DE" dirty="0"/>
+          </a:p>
+          <a:p>
+            <a:r>
+              <a:rPr lang="de-DE" dirty="0" err="1"/>
+              <a:t>Merge</a:t>
+            </a:r>
+            <a:r>
+              <a:rPr lang="de-DE" dirty="0"/>
+              <a:t> </a:t>
+            </a:r>
+            <a:r>
+              <a:rPr lang="de-DE" dirty="0" err="1"/>
+              <a:t>data</a:t>
+            </a:r>
+            <a:r>
+              <a:rPr lang="de-DE" dirty="0"/>
+              <a:t> </a:t>
+            </a:r>
+            <a:r>
+              <a:rPr lang="de-DE" dirty="0" err="1"/>
+              <a:t>for</a:t>
+            </a:r>
+            <a:r>
+              <a:rPr lang="de-DE" dirty="0"/>
+              <a:t> </a:t>
+            </a:r>
+            <a:r>
+              <a:rPr lang="de-DE" dirty="0" err="1"/>
+              <a:t>task</a:t>
+            </a:r>
+            <a:r>
+              <a:rPr lang="de-DE" dirty="0"/>
+              <a:t> A &amp; B: </a:t>
+            </a:r>
+            <a:r>
+              <a:rPr lang="de-DE" dirty="0" err="1"/>
+              <a:t>for</a:t>
+            </a:r>
+            <a:r>
+              <a:rPr lang="de-DE" dirty="0"/>
+              <a:t> ICA, </a:t>
+            </a:r>
+            <a:r>
+              <a:rPr lang="de-DE" dirty="0" err="1"/>
+              <a:t>epoch</a:t>
+            </a:r>
+            <a:r>
+              <a:rPr lang="de-DE" dirty="0"/>
+              <a:t> </a:t>
+            </a:r>
+            <a:r>
+              <a:rPr lang="de-DE" dirty="0" err="1"/>
+              <a:t>data</a:t>
             </a:r>
             <a:r>
               <a:rPr lang="de-DE" dirty="0"/>
@@ -5473,7 +6066,174 @@
             </a:r>
             <a:r>
               <a:rPr lang="de-DE" dirty="0" err="1"/>
-              <a:t>length</a:t>
+              <a:t>detrending</a:t>
+            </a:r>
+            <a:r>
+              <a:rPr lang="de-DE" dirty="0"/>
+              <a:t>, </a:t>
+            </a:r>
+            <a:r>
+              <a:rPr lang="de-DE" dirty="0" err="1"/>
+              <a:t>artifact</a:t>
+            </a:r>
+            <a:r>
+              <a:rPr lang="de-DE" dirty="0"/>
+              <a:t> </a:t>
+            </a:r>
+            <a:r>
+              <a:rPr lang="de-DE" dirty="0" err="1"/>
+              <a:t>rejection</a:t>
+            </a:r>
+            <a:endParaRPr lang="de-DE" dirty="0"/>
+          </a:p>
+          <a:p>
+            <a:pPr lvl="1"/>
+            <a:r>
+              <a:rPr lang="de-DE" dirty="0" err="1"/>
+              <a:t>run</a:t>
+            </a:r>
+            <a:r>
+              <a:rPr lang="de-DE" dirty="0"/>
+              <a:t> ICA (</a:t>
+            </a:r>
+            <a:r>
+              <a:rPr lang="de-DE" dirty="0" err="1"/>
+              <a:t>extended</a:t>
+            </a:r>
+            <a:r>
+              <a:rPr lang="de-DE" dirty="0"/>
+              <a:t> </a:t>
+            </a:r>
+            <a:r>
+              <a:rPr lang="de-DE" dirty="0" err="1"/>
+              <a:t>infomax</a:t>
+            </a:r>
+            <a:r>
+              <a:rPr lang="de-DE" dirty="0"/>
+              <a:t> </a:t>
+            </a:r>
+            <a:r>
+              <a:rPr lang="de-DE" dirty="0" err="1"/>
+              <a:t>algorithm</a:t>
+            </a:r>
+            <a:r>
+              <a:rPr lang="de-DE" dirty="0"/>
+              <a:t>)</a:t>
+            </a:r>
+          </a:p>
+          <a:p>
+            <a:pPr lvl="1"/>
+            <a:r>
+              <a:rPr lang="de-DE" dirty="0" err="1"/>
+              <a:t>Iclabel</a:t>
+            </a:r>
+            <a:r>
+              <a:rPr lang="de-DE" dirty="0"/>
+              <a:t>: </a:t>
+            </a:r>
+            <a:r>
+              <a:rPr lang="de-DE" dirty="0" err="1"/>
+              <a:t>keep</a:t>
+            </a:r>
+            <a:r>
+              <a:rPr lang="de-DE" dirty="0"/>
+              <a:t> </a:t>
+            </a:r>
+            <a:r>
+              <a:rPr lang="de-DE" dirty="0" err="1"/>
+              <a:t>only</a:t>
+            </a:r>
+            <a:r>
+              <a:rPr lang="de-DE" dirty="0"/>
+              <a:t> </a:t>
+            </a:r>
+            <a:r>
+              <a:rPr lang="de-DE" dirty="0" err="1"/>
+              <a:t>those</a:t>
+            </a:r>
+            <a:r>
+              <a:rPr lang="de-DE" dirty="0"/>
+              <a:t> </a:t>
+            </a:r>
+            <a:r>
+              <a:rPr lang="de-DE" dirty="0" err="1"/>
+              <a:t>Ics</a:t>
+            </a:r>
+            <a:r>
+              <a:rPr lang="de-DE" dirty="0"/>
+              <a:t> </a:t>
+            </a:r>
+            <a:r>
+              <a:rPr lang="de-DE" dirty="0" err="1"/>
+              <a:t>that</a:t>
+            </a:r>
+            <a:r>
+              <a:rPr lang="de-DE" dirty="0"/>
+              <a:t> </a:t>
+            </a:r>
+            <a:r>
+              <a:rPr lang="de-DE" dirty="0" err="1"/>
+              <a:t>are</a:t>
+            </a:r>
+            <a:r>
+              <a:rPr lang="de-DE" dirty="0"/>
+              <a:t> </a:t>
+            </a:r>
+            <a:r>
+              <a:rPr lang="de-DE" dirty="0" err="1"/>
+              <a:t>labelled</a:t>
+            </a:r>
+            <a:r>
+              <a:rPr lang="de-DE" dirty="0"/>
+              <a:t> </a:t>
+            </a:r>
+            <a:r>
+              <a:rPr lang="de-DE" dirty="0" err="1"/>
+              <a:t>as</a:t>
+            </a:r>
+            <a:r>
+              <a:rPr lang="de-DE" dirty="0"/>
+              <a:t> </a:t>
+            </a:r>
+            <a:r>
+              <a:rPr lang="de-DE" dirty="0" err="1"/>
+              <a:t>neural</a:t>
+            </a:r>
+            <a:r>
+              <a:rPr lang="de-DE" dirty="0"/>
+              <a:t> </a:t>
+            </a:r>
+            <a:r>
+              <a:rPr lang="de-DE" dirty="0" err="1"/>
+              <a:t>component</a:t>
+            </a:r>
+            <a:r>
+              <a:rPr lang="de-DE" dirty="0"/>
+              <a:t> </a:t>
+            </a:r>
+            <a:r>
+              <a:rPr lang="de-DE" dirty="0" err="1"/>
+              <a:t>with</a:t>
+            </a:r>
+            <a:r>
+              <a:rPr lang="de-DE" dirty="0"/>
+              <a:t> at least 0.5 </a:t>
+            </a:r>
+            <a:r>
+              <a:rPr lang="de-DE" dirty="0" err="1"/>
+              <a:t>probability</a:t>
+            </a:r>
+            <a:endParaRPr lang="de-DE" dirty="0"/>
+          </a:p>
+          <a:p>
+            <a:pPr lvl="1"/>
+            <a:r>
+              <a:rPr lang="de-DE" dirty="0"/>
+              <a:t>Visual </a:t>
+            </a:r>
+            <a:r>
+              <a:rPr lang="de-DE" dirty="0" err="1"/>
+              <a:t>checks</a:t>
             </a:r>
             <a:r>
               <a:rPr lang="de-DE" dirty="0"/>
@@ -5489,19 +6249,82 @@
             </a:r>
             <a:r>
               <a:rPr lang="de-DE" dirty="0" err="1"/>
-              <a:t>wavelet</a:t>
-            </a:r>
-            <a:r>
-              <a:rPr lang="de-DE" dirty="0"/>
-              <a:t> </a:t>
-            </a:r>
-            <a:r>
-              <a:rPr lang="de-DE" dirty="0" err="1"/>
-              <a:t>kernel</a:t>
-            </a:r>
-            <a:r>
-              <a:rPr lang="de-DE" dirty="0"/>
-              <a:t> = 3 (same </a:t>
+              <a:t>remaining</a:t>
+            </a:r>
+            <a:r>
+              <a:rPr lang="de-DE" dirty="0"/>
+              <a:t> </a:t>
+            </a:r>
+            <a:r>
+              <a:rPr lang="de-DE" dirty="0" err="1"/>
+              <a:t>components</a:t>
+            </a:r>
+            <a:endParaRPr lang="de-DE" dirty="0"/>
+          </a:p>
+          <a:p>
+            <a:r>
+              <a:rPr lang="de-DE" dirty="0" err="1"/>
+              <a:t>Parallelize</a:t>
+            </a:r>
+            <a:r>
+              <a:rPr lang="de-DE" dirty="0"/>
+              <a:t> behavioral and EEG </a:t>
+            </a:r>
+            <a:r>
+              <a:rPr lang="de-DE" dirty="0" err="1"/>
+              <a:t>data</a:t>
+            </a:r>
+            <a:r>
+              <a:rPr lang="de-DE" dirty="0"/>
+              <a:t> </a:t>
+            </a:r>
+            <a:r>
+              <a:rPr lang="de-DE" dirty="0">
+                <a:sym typeface="Wingdings" panose="05000000000000000000" pitchFamily="2" charset="2"/>
+              </a:rPr>
+              <a:t> </a:t>
+            </a:r>
+            <a:r>
+              <a:rPr lang="de-DE" dirty="0" err="1">
+                <a:sym typeface="Wingdings" panose="05000000000000000000" pitchFamily="2" charset="2"/>
+              </a:rPr>
+              <a:t>add</a:t>
+            </a:r>
+            <a:r>
+              <a:rPr lang="de-DE" dirty="0">
+                <a:sym typeface="Wingdings" panose="05000000000000000000" pitchFamily="2" charset="2"/>
+              </a:rPr>
+              <a:t> </a:t>
+            </a:r>
+            <a:r>
+              <a:rPr lang="de-DE" dirty="0" err="1">
+                <a:sym typeface="Wingdings" panose="05000000000000000000" pitchFamily="2" charset="2"/>
+              </a:rPr>
+              <a:t>triggers</a:t>
+            </a:r>
+            <a:r>
+              <a:rPr lang="de-DE" dirty="0">
+                <a:sym typeface="Wingdings" panose="05000000000000000000" pitchFamily="2" charset="2"/>
+              </a:rPr>
+              <a:t> etc.</a:t>
+            </a:r>
+          </a:p>
+          <a:p>
+            <a:r>
+              <a:rPr lang="de-DE" dirty="0" err="1"/>
+              <a:t>Epoch</a:t>
+            </a:r>
+            <a:r>
+              <a:rPr lang="de-DE" dirty="0"/>
+              <a:t> </a:t>
+            </a:r>
+            <a:r>
+              <a:rPr lang="de-DE" dirty="0" err="1"/>
+              <a:t>data</a:t>
+            </a:r>
+            <a:r>
+              <a:rPr lang="de-DE" dirty="0"/>
+              <a:t>: 1) </a:t>
             </a:r>
             <a:r>
               <a:rPr lang="de-DE" dirty="0" err="1"/>
@@ -5509,25 +6332,129 @@
             </a:r>
             <a:r>
               <a:rPr lang="de-DE" dirty="0"/>
-              <a:t> all </a:t>
-            </a:r>
-            <a:r>
-              <a:rPr lang="de-DE" dirty="0" err="1"/>
-              <a:t>frequencies</a:t>
-            </a:r>
-            <a:r>
-              <a:rPr lang="de-DE" dirty="0"/>
-              <a:t>)</a:t>
-            </a:r>
-          </a:p>
-          <a:p>
-            <a:r>
-              <a:rPr lang="de-DE" dirty="0" err="1"/>
-              <a:t>Frequencies</a:t>
-            </a:r>
-            <a:r>
-              <a:rPr lang="de-DE" dirty="0"/>
-              <a:t>: 1 </a:t>
+              <a:t> </a:t>
+            </a:r>
+            <a:r>
+              <a:rPr lang="de-DE" dirty="0" err="1"/>
+              <a:t>whole</a:t>
+            </a:r>
+            <a:r>
+              <a:rPr lang="de-DE" dirty="0"/>
+              <a:t> </a:t>
+            </a:r>
+            <a:r>
+              <a:rPr lang="de-DE" dirty="0" err="1"/>
+              <a:t>trial</a:t>
+            </a:r>
+            <a:r>
+              <a:rPr lang="de-DE" dirty="0"/>
+              <a:t> (-1 13) </a:t>
+            </a:r>
+            <a:r>
+              <a:rPr lang="de-DE" dirty="0">
+                <a:sym typeface="Wingdings" panose="05000000000000000000" pitchFamily="2" charset="2"/>
+              </a:rPr>
+              <a:t> </a:t>
+            </a:r>
+            <a:r>
+              <a:rPr lang="de-DE" dirty="0" err="1">
+                <a:sym typeface="Wingdings" panose="05000000000000000000" pitchFamily="2" charset="2"/>
+              </a:rPr>
+              <a:t>baseline</a:t>
+            </a:r>
+            <a:r>
+              <a:rPr lang="de-DE" dirty="0">
+                <a:sym typeface="Wingdings" panose="05000000000000000000" pitchFamily="2" charset="2"/>
+              </a:rPr>
+              <a:t> </a:t>
+            </a:r>
+            <a:r>
+              <a:rPr lang="de-DE" dirty="0" err="1">
+                <a:sym typeface="Wingdings" panose="05000000000000000000" pitchFamily="2" charset="2"/>
+              </a:rPr>
+              <a:t>correction</a:t>
+            </a:r>
+            <a:r>
+              <a:rPr lang="de-DE" dirty="0">
+                <a:sym typeface="Wingdings" panose="05000000000000000000" pitchFamily="2" charset="2"/>
+              </a:rPr>
+              <a:t> </a:t>
+            </a:r>
+            <a:r>
+              <a:rPr lang="de-DE" dirty="0" err="1">
+                <a:sym typeface="Wingdings" panose="05000000000000000000" pitchFamily="2" charset="2"/>
+              </a:rPr>
+              <a:t>for</a:t>
+            </a:r>
+            <a:r>
+              <a:rPr lang="de-DE" dirty="0">
+                <a:sym typeface="Wingdings" panose="05000000000000000000" pitchFamily="2" charset="2"/>
+              </a:rPr>
+              <a:t> </a:t>
+            </a:r>
+            <a:r>
+              <a:rPr lang="de-DE" dirty="0" err="1">
+                <a:sym typeface="Wingdings" panose="05000000000000000000" pitchFamily="2" charset="2"/>
+              </a:rPr>
+              <a:t>fixcross</a:t>
+            </a:r>
+            <a:r>
+              <a:rPr lang="de-DE" dirty="0">
+                <a:sym typeface="Wingdings" panose="05000000000000000000" pitchFamily="2" charset="2"/>
+              </a:rPr>
+              <a:t> </a:t>
+            </a:r>
+            <a:r>
+              <a:rPr lang="de-DE" dirty="0" err="1">
+                <a:sym typeface="Wingdings" panose="05000000000000000000" pitchFamily="2" charset="2"/>
+              </a:rPr>
+              <a:t>interval</a:t>
+            </a:r>
+            <a:r>
+              <a:rPr lang="de-DE" dirty="0">
+                <a:sym typeface="Wingdings" panose="05000000000000000000" pitchFamily="2" charset="2"/>
+              </a:rPr>
+              <a:t> (-750 0)</a:t>
+            </a:r>
+            <a:endParaRPr lang="de-DE" dirty="0"/>
+          </a:p>
+          <a:p>
+            <a:pPr lvl="1"/>
+            <a:r>
+              <a:rPr lang="de-DE" dirty="0"/>
+              <a:t>2)  -1 4 </a:t>
+            </a:r>
+            <a:r>
+              <a:rPr lang="de-DE" dirty="0" err="1"/>
+              <a:t>for</a:t>
+            </a:r>
+            <a:r>
+              <a:rPr lang="de-DE" dirty="0"/>
+              <a:t> </a:t>
+            </a:r>
+            <a:r>
+              <a:rPr lang="de-DE" dirty="0" err="1"/>
+              <a:t>task</a:t>
+            </a:r>
+            <a:r>
+              <a:rPr lang="de-DE" dirty="0"/>
+              <a:t> A and B, </a:t>
+            </a:r>
+            <a:r>
+              <a:rPr lang="de-DE" dirty="0" err="1"/>
+              <a:t>later</a:t>
+            </a:r>
+            <a:r>
+              <a:rPr lang="de-DE" dirty="0"/>
+              <a:t> </a:t>
+            </a:r>
+            <a:r>
+              <a:rPr lang="de-DE" dirty="0" err="1"/>
+              <a:t>reduced</a:t>
+            </a:r>
+            <a:r>
+              <a:rPr lang="de-DE" dirty="0"/>
+              <a:t> </a:t>
             </a:r>
             <a:r>
               <a:rPr lang="de-DE" dirty="0" err="1"/>
@@ -5535,135 +6462,58 @@
             </a:r>
             <a:r>
               <a:rPr lang="de-DE" dirty="0"/>
-              <a:t> 35 Hz </a:t>
-            </a:r>
-          </a:p>
-          <a:p>
-            <a:r>
-              <a:rPr lang="de-DE" dirty="0"/>
-              <a:t>Cluster </a:t>
-            </a:r>
-            <a:r>
-              <a:rPr lang="de-DE" dirty="0" err="1"/>
-              <a:t>based</a:t>
-            </a:r>
-            <a:r>
-              <a:rPr lang="de-DE" dirty="0"/>
-              <a:t> </a:t>
-            </a:r>
-            <a:r>
-              <a:rPr lang="de-DE" dirty="0" err="1"/>
-              <a:t>permutation</a:t>
-            </a:r>
-            <a:r>
-              <a:rPr lang="de-DE" dirty="0"/>
-              <a:t> </a:t>
-            </a:r>
-            <a:r>
-              <a:rPr lang="de-DE" dirty="0" err="1"/>
-              <a:t>test</a:t>
-            </a:r>
-            <a:r>
-              <a:rPr lang="de-DE" dirty="0"/>
-              <a:t>: </a:t>
-            </a:r>
+              <a:t> relevant time </a:t>
+            </a:r>
+            <a:r>
+              <a:rPr lang="de-DE" dirty="0" err="1"/>
+              <a:t>interval</a:t>
+            </a:r>
+            <a:endParaRPr lang="de-DE" dirty="0"/>
+          </a:p>
+          <a:p>
+            <a:r>
+              <a:rPr lang="de-DE" dirty="0" err="1"/>
+              <a:t>Artifact</a:t>
+            </a:r>
+            <a:r>
+              <a:rPr lang="de-DE" dirty="0"/>
+              <a:t> </a:t>
+            </a:r>
+            <a:r>
+              <a:rPr lang="de-DE" dirty="0" err="1"/>
+              <a:t>rejection</a:t>
+            </a:r>
+            <a:r>
+              <a:rPr lang="de-DE" dirty="0"/>
+              <a:t> </a:t>
+            </a:r>
+            <a:r>
+              <a:rPr lang="de-DE" dirty="0" err="1"/>
+              <a:t>for</a:t>
+            </a:r>
+            <a:r>
+              <a:rPr lang="de-DE" dirty="0"/>
+              <a:t> </a:t>
+            </a:r>
+            <a:r>
+              <a:rPr lang="de-DE" dirty="0" err="1"/>
+              <a:t>segments</a:t>
+            </a:r>
+            <a:endParaRPr lang="de-DE" dirty="0"/>
           </a:p>
           <a:p>
             <a:pPr lvl="1"/>
-            <a:r>
-              <a:rPr lang="de-DE" dirty="0"/>
-              <a:t>Monte-Carlo, 1000 </a:t>
-            </a:r>
-            <a:r>
-              <a:rPr lang="de-DE" dirty="0" err="1"/>
-              <a:t>iterations</a:t>
-            </a:r>
-            <a:r>
-              <a:rPr lang="de-DE" dirty="0"/>
-              <a:t>, </a:t>
-            </a:r>
-            <a:r>
-              <a:rPr lang="de-DE" dirty="0" err="1"/>
-              <a:t>alpha</a:t>
-            </a:r>
-            <a:r>
-              <a:rPr lang="de-DE" dirty="0"/>
-              <a:t> = 0.001, </a:t>
-            </a:r>
-            <a:r>
-              <a:rPr lang="de-DE" dirty="0" err="1"/>
-              <a:t>cluster</a:t>
-            </a:r>
-            <a:r>
-              <a:rPr lang="de-DE" dirty="0"/>
-              <a:t> </a:t>
-            </a:r>
-            <a:r>
-              <a:rPr lang="de-DE" dirty="0" err="1"/>
-              <a:t>alpha</a:t>
-            </a:r>
-            <a:r>
-              <a:rPr lang="de-DE" dirty="0"/>
-              <a:t> = 0.001</a:t>
-            </a:r>
-          </a:p>
-          <a:p>
-            <a:pPr lvl="1"/>
-            <a:r>
-              <a:rPr lang="de-DE" dirty="0" err="1"/>
-              <a:t>Until</a:t>
-            </a:r>
-            <a:r>
-              <a:rPr lang="de-DE" dirty="0"/>
-              <a:t> </a:t>
-            </a:r>
-            <a:r>
-              <a:rPr lang="de-DE" dirty="0" err="1"/>
-              <a:t>now</a:t>
-            </a:r>
-            <a:r>
-              <a:rPr lang="de-DE" dirty="0"/>
-              <a:t> </a:t>
-            </a:r>
-            <a:r>
-              <a:rPr lang="de-DE" dirty="0" err="1"/>
-              <a:t>only</a:t>
-            </a:r>
-            <a:r>
-              <a:rPr lang="de-DE" dirty="0"/>
-              <a:t> </a:t>
-            </a:r>
-            <a:r>
-              <a:rPr lang="de-DE" dirty="0" err="1"/>
-              <a:t>for</a:t>
-            </a:r>
-            <a:r>
-              <a:rPr lang="de-DE" dirty="0"/>
-              <a:t> </a:t>
-            </a:r>
-            <a:r>
-              <a:rPr lang="de-DE" dirty="0" err="1"/>
-              <a:t>theta</a:t>
-            </a:r>
-            <a:r>
-              <a:rPr lang="de-DE" dirty="0"/>
-              <a:t> and </a:t>
-            </a:r>
-            <a:r>
-              <a:rPr lang="de-DE" dirty="0" err="1"/>
-              <a:t>alpha</a:t>
-            </a:r>
-            <a:r>
-              <a:rPr lang="de-DE" dirty="0"/>
-              <a:t> band</a:t>
-            </a:r>
+            <a:endParaRPr lang="de-DE" dirty="0"/>
+          </a:p>
+          <a:p>
+            <a:endParaRPr lang="de-DE" dirty="0"/>
           </a:p>
         </p:txBody>
       </p:sp>
     </p:spTree>
     <p:extLst>
       <p:ext uri="{BB962C8B-B14F-4D97-AF65-F5344CB8AC3E}">
-        <p14:creationId xmlns:p14="http://schemas.microsoft.com/office/powerpoint/2010/main" val="4080053222"/>
+        <p14:creationId xmlns:p14="http://schemas.microsoft.com/office/powerpoint/2010/main" val="719098218"/>
       </p:ext>
     </p:extLst>
   </p:cSld>
@@ -5695,6 +6545,355 @@
           <p:cNvPr id="2" name="Titel 1">
             <a:extLst>
               <a:ext uri="{FF2B5EF4-FFF2-40B4-BE49-F238E27FC236}">
+                <a16:creationId xmlns:a16="http://schemas.microsoft.com/office/drawing/2014/main" id="{163CECCD-431A-4FD5-8B6C-F3E960ACADC1}"/>
+              </a:ext>
+            </a:extLst>
+          </p:cNvPr>
+          <p:cNvSpPr>
+            <a:spLocks noGrp="1"/>
+          </p:cNvSpPr>
+          <p:nvPr>
+            <p:ph type="title"/>
+          </p:nvPr>
+        </p:nvSpPr>
+        <p:spPr/>
+        <p:txBody>
+          <a:bodyPr/>
+          <a:lstStyle/>
+          <a:p>
+            <a:r>
+              <a:rPr lang="de-DE" dirty="0"/>
+              <a:t>Wavelet </a:t>
+            </a:r>
+            <a:r>
+              <a:rPr lang="de-DE" dirty="0" err="1"/>
+              <a:t>analysis</a:t>
+            </a:r>
+            <a:r>
+              <a:rPr lang="de-DE" dirty="0"/>
+              <a:t> &amp; cluster-</a:t>
+            </a:r>
+            <a:r>
+              <a:rPr lang="de-DE" dirty="0" err="1"/>
+              <a:t>based</a:t>
+            </a:r>
+            <a:r>
+              <a:rPr lang="de-DE" dirty="0"/>
+              <a:t> </a:t>
+            </a:r>
+            <a:r>
+              <a:rPr lang="de-DE" dirty="0" err="1"/>
+              <a:t>permutation</a:t>
+            </a:r>
+            <a:r>
+              <a:rPr lang="de-DE" dirty="0"/>
+              <a:t> </a:t>
+            </a:r>
+            <a:r>
+              <a:rPr lang="de-DE" dirty="0" err="1"/>
+              <a:t>test</a:t>
+            </a:r>
+            <a:endParaRPr lang="de-DE" dirty="0"/>
+          </a:p>
+        </p:txBody>
+      </p:sp>
+      <p:sp>
+        <p:nvSpPr>
+          <p:cNvPr id="3" name="Inhaltsplatzhalter 2">
+            <a:extLst>
+              <a:ext uri="{FF2B5EF4-FFF2-40B4-BE49-F238E27FC236}">
+                <a16:creationId xmlns:a16="http://schemas.microsoft.com/office/drawing/2014/main" id="{2362F52C-3AFD-412B-AEA5-964704AB3EC8}"/>
+              </a:ext>
+            </a:extLst>
+          </p:cNvPr>
+          <p:cNvSpPr>
+            <a:spLocks noGrp="1"/>
+          </p:cNvSpPr>
+          <p:nvPr>
+            <p:ph idx="1"/>
+          </p:nvPr>
+        </p:nvSpPr>
+        <p:spPr/>
+        <p:txBody>
+          <a:bodyPr/>
+          <a:lstStyle/>
+          <a:p>
+            <a:r>
+              <a:rPr lang="de-DE" dirty="0" err="1"/>
+              <a:t>Morlet</a:t>
+            </a:r>
+            <a:r>
+              <a:rPr lang="de-DE" dirty="0"/>
+              <a:t> </a:t>
+            </a:r>
+            <a:r>
+              <a:rPr lang="de-DE" dirty="0" err="1"/>
+              <a:t>wavelet</a:t>
+            </a:r>
+            <a:r>
+              <a:rPr lang="de-DE" dirty="0"/>
+              <a:t>: 5 </a:t>
+            </a:r>
+            <a:r>
+              <a:rPr lang="de-DE" dirty="0" err="1"/>
+              <a:t>cycles</a:t>
+            </a:r>
+            <a:r>
+              <a:rPr lang="de-DE" dirty="0"/>
+              <a:t>, </a:t>
+            </a:r>
+            <a:r>
+              <a:rPr lang="de-DE" dirty="0" err="1"/>
+              <a:t>length</a:t>
+            </a:r>
+            <a:r>
+              <a:rPr lang="de-DE" dirty="0"/>
+              <a:t> </a:t>
+            </a:r>
+            <a:r>
+              <a:rPr lang="de-DE" dirty="0" err="1"/>
+              <a:t>of</a:t>
+            </a:r>
+            <a:r>
+              <a:rPr lang="de-DE" dirty="0"/>
+              <a:t> </a:t>
+            </a:r>
+            <a:r>
+              <a:rPr lang="de-DE" dirty="0" err="1"/>
+              <a:t>wavelet</a:t>
+            </a:r>
+            <a:r>
+              <a:rPr lang="de-DE" dirty="0"/>
+              <a:t> </a:t>
+            </a:r>
+            <a:r>
+              <a:rPr lang="de-DE" dirty="0" err="1"/>
+              <a:t>kernel</a:t>
+            </a:r>
+            <a:r>
+              <a:rPr lang="de-DE" dirty="0"/>
+              <a:t> = 3 (same </a:t>
+            </a:r>
+            <a:r>
+              <a:rPr lang="de-DE" dirty="0" err="1"/>
+              <a:t>for</a:t>
+            </a:r>
+            <a:r>
+              <a:rPr lang="de-DE" dirty="0"/>
+              <a:t> all </a:t>
+            </a:r>
+            <a:r>
+              <a:rPr lang="de-DE" dirty="0" err="1"/>
+              <a:t>frequencies</a:t>
+            </a:r>
+            <a:r>
+              <a:rPr lang="de-DE" dirty="0"/>
+              <a:t>)</a:t>
+            </a:r>
+          </a:p>
+          <a:p>
+            <a:r>
+              <a:rPr lang="de-DE" dirty="0" err="1"/>
+              <a:t>Frequencies</a:t>
+            </a:r>
+            <a:r>
+              <a:rPr lang="de-DE" dirty="0"/>
+              <a:t>: 1 </a:t>
+            </a:r>
+            <a:r>
+              <a:rPr lang="de-DE" dirty="0" err="1"/>
+              <a:t>to</a:t>
+            </a:r>
+            <a:r>
+              <a:rPr lang="de-DE" dirty="0"/>
+              <a:t> 35 Hz </a:t>
+            </a:r>
+          </a:p>
+          <a:p>
+            <a:r>
+              <a:rPr lang="de-DE" dirty="0"/>
+              <a:t>Cluster </a:t>
+            </a:r>
+            <a:r>
+              <a:rPr lang="de-DE" dirty="0" err="1"/>
+              <a:t>based</a:t>
+            </a:r>
+            <a:r>
+              <a:rPr lang="de-DE" dirty="0"/>
+              <a:t> </a:t>
+            </a:r>
+            <a:r>
+              <a:rPr lang="de-DE" dirty="0" err="1"/>
+              <a:t>permutation</a:t>
+            </a:r>
+            <a:r>
+              <a:rPr lang="de-DE" dirty="0"/>
+              <a:t> </a:t>
+            </a:r>
+            <a:r>
+              <a:rPr lang="de-DE" dirty="0" err="1"/>
+              <a:t>test</a:t>
+            </a:r>
+            <a:r>
+              <a:rPr lang="de-DE" dirty="0"/>
+              <a:t>: </a:t>
+            </a:r>
+          </a:p>
+          <a:p>
+            <a:pPr lvl="1"/>
+            <a:r>
+              <a:rPr lang="de-DE" dirty="0"/>
+              <a:t>Monte-Carlo, 1000 </a:t>
+            </a:r>
+            <a:r>
+              <a:rPr lang="de-DE" dirty="0" err="1"/>
+              <a:t>iterations</a:t>
+            </a:r>
+            <a:r>
+              <a:rPr lang="de-DE" dirty="0"/>
+              <a:t>, </a:t>
+            </a:r>
+            <a:r>
+              <a:rPr lang="de-DE" dirty="0" err="1"/>
+              <a:t>alpha</a:t>
+            </a:r>
+            <a:r>
+              <a:rPr lang="de-DE" dirty="0"/>
+              <a:t> = 0.001, </a:t>
+            </a:r>
+            <a:r>
+              <a:rPr lang="de-DE" dirty="0" err="1"/>
+              <a:t>cluster</a:t>
+            </a:r>
+            <a:r>
+              <a:rPr lang="de-DE" dirty="0"/>
+              <a:t> </a:t>
+            </a:r>
+            <a:r>
+              <a:rPr lang="de-DE" dirty="0" err="1"/>
+              <a:t>alpha</a:t>
+            </a:r>
+            <a:r>
+              <a:rPr lang="de-DE" dirty="0"/>
+              <a:t> = 0.001</a:t>
+            </a:r>
+          </a:p>
+          <a:p>
+            <a:pPr lvl="1"/>
+            <a:r>
+              <a:rPr lang="de-DE" dirty="0" err="1"/>
+              <a:t>Until</a:t>
+            </a:r>
+            <a:r>
+              <a:rPr lang="de-DE" dirty="0"/>
+              <a:t> </a:t>
+            </a:r>
+            <a:r>
+              <a:rPr lang="de-DE" dirty="0" err="1"/>
+              <a:t>now</a:t>
+            </a:r>
+            <a:r>
+              <a:rPr lang="de-DE" dirty="0"/>
+              <a:t> </a:t>
+            </a:r>
+            <a:r>
+              <a:rPr lang="de-DE" dirty="0" err="1"/>
+              <a:t>only</a:t>
+            </a:r>
+            <a:r>
+              <a:rPr lang="de-DE" dirty="0"/>
+              <a:t> </a:t>
+            </a:r>
+            <a:r>
+              <a:rPr lang="de-DE" dirty="0" err="1"/>
+              <a:t>for</a:t>
+            </a:r>
+            <a:r>
+              <a:rPr lang="de-DE" dirty="0"/>
+              <a:t> </a:t>
+            </a:r>
+            <a:r>
+              <a:rPr lang="de-DE" dirty="0" err="1"/>
+              <a:t>theta</a:t>
+            </a:r>
+            <a:r>
+              <a:rPr lang="de-DE" dirty="0"/>
+              <a:t> and </a:t>
+            </a:r>
+            <a:r>
+              <a:rPr lang="de-DE" dirty="0" err="1"/>
+              <a:t>alpha</a:t>
+            </a:r>
+            <a:r>
+              <a:rPr lang="de-DE" dirty="0"/>
+              <a:t> band</a:t>
+            </a:r>
+          </a:p>
+          <a:p>
+            <a:pPr lvl="1"/>
+            <a:r>
+              <a:rPr lang="de-DE" dirty="0"/>
+              <a:t>Not </a:t>
+            </a:r>
+            <a:r>
+              <a:rPr lang="de-DE" dirty="0" err="1"/>
+              <a:t>averaged</a:t>
+            </a:r>
+            <a:r>
+              <a:rPr lang="de-DE" dirty="0"/>
+              <a:t> </a:t>
+            </a:r>
+            <a:r>
+              <a:rPr lang="de-DE" dirty="0" err="1"/>
+              <a:t>over</a:t>
+            </a:r>
+            <a:r>
+              <a:rPr lang="de-DE" dirty="0"/>
+              <a:t> time and </a:t>
+            </a:r>
+            <a:r>
+              <a:rPr lang="de-DE" dirty="0" err="1"/>
+              <a:t>frequencies</a:t>
+            </a:r>
+            <a:endParaRPr lang="de-DE" dirty="0"/>
+          </a:p>
+        </p:txBody>
+      </p:sp>
+    </p:spTree>
+    <p:extLst>
+      <p:ext uri="{BB962C8B-B14F-4D97-AF65-F5344CB8AC3E}">
+        <p14:creationId xmlns:p14="http://schemas.microsoft.com/office/powerpoint/2010/main" val="4080053222"/>
+      </p:ext>
+    </p:extLst>
+  </p:cSld>
+  <p:clrMapOvr>
+    <a:masterClrMapping/>
+  </p:clrMapOvr>
+</p:sld>
+</file>
+
+<file path=ppt/slides/slide4.xml><?xml version="1.0" encoding="utf-8"?>
+<p:sld xmlns:a="http://schemas.openxmlformats.org/drawingml/2006/main" xmlns:r="http://schemas.openxmlformats.org/officeDocument/2006/relationships" xmlns:p="http://schemas.openxmlformats.org/presentationml/2006/main">
+  <p:cSld>
+    <p:spTree>
+      <p:nvGrpSpPr>
+        <p:cNvPr id="1" name=""/>
+        <p:cNvGrpSpPr/>
+        <p:nvPr/>
+      </p:nvGrpSpPr>
+      <p:grpSpPr>
+        <a:xfrm>
+          <a:off x="0" y="0"/>
+          <a:ext cx="0" cy="0"/>
+          <a:chOff x="0" y="0"/>
+          <a:chExt cx="0" cy="0"/>
+        </a:xfrm>
+      </p:grpSpPr>
+      <p:sp>
+        <p:nvSpPr>
+          <p:cNvPr id="2" name="Titel 1">
+            <a:extLst>
+              <a:ext uri="{FF2B5EF4-FFF2-40B4-BE49-F238E27FC236}">
                 <a16:creationId xmlns:a16="http://schemas.microsoft.com/office/drawing/2014/main" id="{124E36E6-16D8-451C-A051-905F0C9650AD}"/>
               </a:ext>
             </a:extLst>
@@ -5982,7 +7181,7 @@
 </p:sld>
 </file>
 
-<file path=ppt/slides/slide4.xml><?xml version="1.0" encoding="utf-8"?>
+<file path=ppt/slides/slide5.xml><?xml version="1.0" encoding="utf-8"?>
 <p:sld xmlns:a="http://schemas.openxmlformats.org/drawingml/2006/main" xmlns:r="http://schemas.openxmlformats.org/officeDocument/2006/relationships" xmlns:p="http://schemas.openxmlformats.org/presentationml/2006/main">
   <p:cSld>
     <p:spTree>
@@ -6402,7 +7601,7 @@
 </p:sld>
 </file>
 
-<file path=ppt/slides/slide5.xml><?xml version="1.0" encoding="utf-8"?>
+<file path=ppt/slides/slide6.xml><?xml version="1.0" encoding="utf-8"?>
 <p:sld xmlns:a="http://schemas.openxmlformats.org/drawingml/2006/main" xmlns:r="http://schemas.openxmlformats.org/officeDocument/2006/relationships" xmlns:p="http://schemas.openxmlformats.org/presentationml/2006/main">
   <p:cSld>
     <p:spTree>
@@ -6680,7 +7879,7 @@
 </p:sld>
 </file>
 
-<file path=ppt/slides/slide6.xml><?xml version="1.0" encoding="utf-8"?>
+<file path=ppt/slides/slide7.xml><?xml version="1.0" encoding="utf-8"?>
 <p:sld xmlns:a="http://schemas.openxmlformats.org/drawingml/2006/main" xmlns:r="http://schemas.openxmlformats.org/officeDocument/2006/relationships" xmlns:p="http://schemas.openxmlformats.org/presentationml/2006/main">
   <p:cSld>
     <p:spTree>
@@ -7022,7 +8221,7 @@
 </p:sld>
 </file>
 
-<file path=ppt/slides/slide7.xml><?xml version="1.0" encoding="utf-8"?>
+<file path=ppt/slides/slide8.xml><?xml version="1.0" encoding="utf-8"?>
 <p:sld xmlns:a="http://schemas.openxmlformats.org/drawingml/2006/main" xmlns:r="http://schemas.openxmlformats.org/officeDocument/2006/relationships" xmlns:p="http://schemas.openxmlformats.org/presentationml/2006/main">
   <p:cSld>
     <p:spTree>
@@ -7260,7 +8459,7 @@
 </p:sld>
 </file>
 
-<file path=ppt/slides/slide8.xml><?xml version="1.0" encoding="utf-8"?>
+<file path=ppt/slides/slide9.xml><?xml version="1.0" encoding="utf-8"?>
 <p:sld xmlns:a="http://schemas.openxmlformats.org/drawingml/2006/main" xmlns:r="http://schemas.openxmlformats.org/officeDocument/2006/relationships" xmlns:p="http://schemas.openxmlformats.org/presentationml/2006/main">
   <p:cSld>
     <p:spTree>
@@ -7619,374 +8818,6 @@
     <p:extLst>
       <p:ext uri="{BB962C8B-B14F-4D97-AF65-F5344CB8AC3E}">
         <p14:creationId xmlns:p14="http://schemas.microsoft.com/office/powerpoint/2010/main" val="896055594"/>
-      </p:ext>
-    </p:extLst>
-  </p:cSld>
-  <p:clrMapOvr>
-    <a:masterClrMapping/>
-  </p:clrMapOvr>
-</p:sld>
-</file>
-
-<file path=ppt/slides/slide9.xml><?xml version="1.0" encoding="utf-8"?>
-<p:sld xmlns:a="http://schemas.openxmlformats.org/drawingml/2006/main" xmlns:r="http://schemas.openxmlformats.org/officeDocument/2006/relationships" xmlns:p="http://schemas.openxmlformats.org/presentationml/2006/main">
-  <p:cSld>
-    <p:spTree>
-      <p:nvGrpSpPr>
-        <p:cNvPr id="1" name=""/>
-        <p:cNvGrpSpPr/>
-        <p:nvPr/>
-      </p:nvGrpSpPr>
-      <p:grpSpPr>
-        <a:xfrm>
-          <a:off x="0" y="0"/>
-          <a:ext cx="0" cy="0"/>
-          <a:chOff x="0" y="0"/>
-          <a:chExt cx="0" cy="0"/>
-        </a:xfrm>
-      </p:grpSpPr>
-      <p:sp>
-        <p:nvSpPr>
-          <p:cNvPr id="2" name="Titel 1">
-            <a:extLst>
-              <a:ext uri="{FF2B5EF4-FFF2-40B4-BE49-F238E27FC236}">
-                <a16:creationId xmlns:a16="http://schemas.microsoft.com/office/drawing/2014/main" id="{FECB4B52-5B3A-4F59-B3E5-2C791414DFBF}"/>
-              </a:ext>
-            </a:extLst>
-          </p:cNvPr>
-          <p:cNvSpPr>
-            <a:spLocks noGrp="1"/>
-          </p:cNvSpPr>
-          <p:nvPr>
-            <p:ph type="title"/>
-          </p:nvPr>
-        </p:nvSpPr>
-        <p:spPr/>
-        <p:txBody>
-          <a:bodyPr/>
-          <a:lstStyle/>
-          <a:p>
-            <a:r>
-              <a:rPr lang="de-DE" dirty="0" err="1"/>
-              <a:t>Difference</a:t>
-            </a:r>
-            <a:r>
-              <a:rPr lang="de-DE" dirty="0"/>
-              <a:t>: </a:t>
-            </a:r>
-            <a:r>
-              <a:rPr lang="de-DE" dirty="0" err="1"/>
-              <a:t>constant</a:t>
-            </a:r>
-            <a:r>
-              <a:rPr lang="de-DE" dirty="0"/>
-              <a:t> – rand2</a:t>
-            </a:r>
-          </a:p>
-        </p:txBody>
-      </p:sp>
-      <p:pic>
-        <p:nvPicPr>
-          <p:cNvPr id="4" name="Grafik 3">
-            <a:extLst>
-              <a:ext uri="{FF2B5EF4-FFF2-40B4-BE49-F238E27FC236}">
-                <a16:creationId xmlns:a16="http://schemas.microsoft.com/office/drawing/2014/main" id="{2C3E4D40-1B67-4BA8-A964-D688DAAC6056}"/>
-              </a:ext>
-            </a:extLst>
-          </p:cNvPr>
-          <p:cNvPicPr>
-            <a:picLocks noChangeAspect="1"/>
-          </p:cNvPicPr>
-          <p:nvPr/>
-        </p:nvPicPr>
-        <p:blipFill>
-          <a:blip r:embed="rId2"/>
-          <a:stretch>
-            <a:fillRect/>
-          </a:stretch>
-        </p:blipFill>
-        <p:spPr>
-          <a:xfrm>
-            <a:off x="479612" y="1404423"/>
-            <a:ext cx="6907306" cy="5283640"/>
-          </a:xfrm>
-          <a:prstGeom prst="rect">
-            <a:avLst/>
-          </a:prstGeom>
-        </p:spPr>
-      </p:pic>
-      <p:pic>
-        <p:nvPicPr>
-          <p:cNvPr id="5" name="Grafik 4">
-            <a:extLst>
-              <a:ext uri="{FF2B5EF4-FFF2-40B4-BE49-F238E27FC236}">
-                <a16:creationId xmlns:a16="http://schemas.microsoft.com/office/drawing/2014/main" id="{B78FED02-A17C-49FB-8644-0357C6E4F048}"/>
-              </a:ext>
-            </a:extLst>
-          </p:cNvPr>
-          <p:cNvPicPr>
-            <a:picLocks noChangeAspect="1"/>
-          </p:cNvPicPr>
-          <p:nvPr/>
-        </p:nvPicPr>
-        <p:blipFill>
-          <a:blip r:embed="rId3"/>
-          <a:stretch>
-            <a:fillRect/>
-          </a:stretch>
-        </p:blipFill>
-        <p:spPr>
-          <a:xfrm>
-            <a:off x="7758953" y="1027906"/>
-            <a:ext cx="3245223" cy="2708937"/>
-          </a:xfrm>
-          <a:prstGeom prst="rect">
-            <a:avLst/>
-          </a:prstGeom>
-        </p:spPr>
-      </p:pic>
-      <p:pic>
-        <p:nvPicPr>
-          <p:cNvPr id="6" name="Grafik 5">
-            <a:extLst>
-              <a:ext uri="{FF2B5EF4-FFF2-40B4-BE49-F238E27FC236}">
-                <a16:creationId xmlns:a16="http://schemas.microsoft.com/office/drawing/2014/main" id="{4F9D5D04-9E91-4C6B-846A-C7B98893A738}"/>
-              </a:ext>
-            </a:extLst>
-          </p:cNvPr>
-          <p:cNvPicPr>
-            <a:picLocks noChangeAspect="1"/>
-          </p:cNvPicPr>
-          <p:nvPr/>
-        </p:nvPicPr>
-        <p:blipFill>
-          <a:blip r:embed="rId4"/>
-          <a:stretch>
-            <a:fillRect/>
-          </a:stretch>
-        </p:blipFill>
-        <p:spPr>
-          <a:xfrm>
-            <a:off x="7860969" y="3925923"/>
-            <a:ext cx="3143207" cy="2566952"/>
-          </a:xfrm>
-          <a:prstGeom prst="rect">
-            <a:avLst/>
-          </a:prstGeom>
-        </p:spPr>
-      </p:pic>
-      <p:sp>
-        <p:nvSpPr>
-          <p:cNvPr id="7" name="Rechteck: abgerundete Ecken 6">
-            <a:extLst>
-              <a:ext uri="{FF2B5EF4-FFF2-40B4-BE49-F238E27FC236}">
-                <a16:creationId xmlns:a16="http://schemas.microsoft.com/office/drawing/2014/main" id="{E6DFB4B0-B3E9-48BA-9D9E-8246070CAA26}"/>
-              </a:ext>
-            </a:extLst>
-          </p:cNvPr>
-          <p:cNvSpPr/>
-          <p:nvPr/>
-        </p:nvSpPr>
-        <p:spPr>
-          <a:xfrm>
-            <a:off x="2850775" y="1606970"/>
-            <a:ext cx="1792943" cy="1185946"/>
-          </a:xfrm>
-          <a:prstGeom prst="roundRect">
-            <a:avLst>
-              <a:gd name="adj" fmla="val 0"/>
-            </a:avLst>
-          </a:prstGeom>
-          <a:noFill/>
-          <a:ln w="28575">
-            <a:solidFill>
-              <a:srgbClr val="00B050"/>
-            </a:solidFill>
-          </a:ln>
-        </p:spPr>
-        <p:style>
-          <a:lnRef idx="2">
-            <a:schemeClr val="accent6"/>
-          </a:lnRef>
-          <a:fillRef idx="1">
-            <a:schemeClr val="lt1"/>
-          </a:fillRef>
-          <a:effectRef idx="0">
-            <a:schemeClr val="accent6"/>
-          </a:effectRef>
-          <a:fontRef idx="minor">
-            <a:schemeClr val="dk1"/>
-          </a:fontRef>
-        </p:style>
-        <p:txBody>
-          <a:bodyPr rtlCol="0" anchor="ctr"/>
-          <a:lstStyle/>
-          <a:p>
-            <a:pPr algn="ctr"/>
-            <a:endParaRPr lang="de-DE"/>
-          </a:p>
-        </p:txBody>
-      </p:sp>
-      <p:sp>
-        <p:nvSpPr>
-          <p:cNvPr id="8" name="Rechteck: abgerundete Ecken 7">
-            <a:extLst>
-              <a:ext uri="{FF2B5EF4-FFF2-40B4-BE49-F238E27FC236}">
-                <a16:creationId xmlns:a16="http://schemas.microsoft.com/office/drawing/2014/main" id="{A931BC8D-A70C-4828-AB81-64370CED5761}"/>
-              </a:ext>
-            </a:extLst>
-          </p:cNvPr>
-          <p:cNvSpPr/>
-          <p:nvPr/>
-        </p:nvSpPr>
-        <p:spPr>
-          <a:xfrm>
-            <a:off x="2152316" y="4922090"/>
-            <a:ext cx="3046427" cy="1427350"/>
-          </a:xfrm>
-          <a:prstGeom prst="roundRect">
-            <a:avLst>
-              <a:gd name="adj" fmla="val 0"/>
-            </a:avLst>
-          </a:prstGeom>
-          <a:noFill/>
-          <a:ln w="28575">
-            <a:solidFill>
-              <a:srgbClr val="7030A0"/>
-            </a:solidFill>
-          </a:ln>
-        </p:spPr>
-        <p:style>
-          <a:lnRef idx="2">
-            <a:schemeClr val="accent6"/>
-          </a:lnRef>
-          <a:fillRef idx="1">
-            <a:schemeClr val="lt1"/>
-          </a:fillRef>
-          <a:effectRef idx="0">
-            <a:schemeClr val="accent6"/>
-          </a:effectRef>
-          <a:fontRef idx="minor">
-            <a:schemeClr val="dk1"/>
-          </a:fontRef>
-        </p:style>
-        <p:txBody>
-          <a:bodyPr rtlCol="0" anchor="ctr"/>
-          <a:lstStyle/>
-          <a:p>
-            <a:pPr algn="ctr"/>
-            <a:endParaRPr lang="de-DE"/>
-          </a:p>
-        </p:txBody>
-      </p:sp>
-      <p:sp>
-        <p:nvSpPr>
-          <p:cNvPr id="9" name="Rechteck: abgerundete Ecken 8">
-            <a:extLst>
-              <a:ext uri="{FF2B5EF4-FFF2-40B4-BE49-F238E27FC236}">
-                <a16:creationId xmlns:a16="http://schemas.microsoft.com/office/drawing/2014/main" id="{3CAB1BE3-78FB-4E72-9ADA-67AD0391E222}"/>
-              </a:ext>
-            </a:extLst>
-          </p:cNvPr>
-          <p:cNvSpPr/>
-          <p:nvPr/>
-        </p:nvSpPr>
-        <p:spPr>
-          <a:xfrm>
-            <a:off x="7723096" y="3827777"/>
-            <a:ext cx="3446928" cy="2860285"/>
-          </a:xfrm>
-          <a:prstGeom prst="roundRect">
-            <a:avLst>
-              <a:gd name="adj" fmla="val 0"/>
-            </a:avLst>
-          </a:prstGeom>
-          <a:noFill/>
-          <a:ln w="28575">
-            <a:solidFill>
-              <a:srgbClr val="7030A0"/>
-            </a:solidFill>
-          </a:ln>
-        </p:spPr>
-        <p:style>
-          <a:lnRef idx="2">
-            <a:schemeClr val="accent6"/>
-          </a:lnRef>
-          <a:fillRef idx="1">
-            <a:schemeClr val="lt1"/>
-          </a:fillRef>
-          <a:effectRef idx="0">
-            <a:schemeClr val="accent6"/>
-          </a:effectRef>
-          <a:fontRef idx="minor">
-            <a:schemeClr val="dk1"/>
-          </a:fontRef>
-        </p:style>
-        <p:txBody>
-          <a:bodyPr rtlCol="0" anchor="ctr"/>
-          <a:lstStyle/>
-          <a:p>
-            <a:pPr algn="ctr"/>
-            <a:endParaRPr lang="de-DE"/>
-          </a:p>
-        </p:txBody>
-      </p:sp>
-      <p:sp>
-        <p:nvSpPr>
-          <p:cNvPr id="10" name="Rechteck: abgerundete Ecken 9">
-            <a:extLst>
-              <a:ext uri="{FF2B5EF4-FFF2-40B4-BE49-F238E27FC236}">
-                <a16:creationId xmlns:a16="http://schemas.microsoft.com/office/drawing/2014/main" id="{5EE2C4F0-D747-4C39-A216-542380EC0ADB}"/>
-              </a:ext>
-            </a:extLst>
-          </p:cNvPr>
-          <p:cNvSpPr/>
-          <p:nvPr/>
-        </p:nvSpPr>
-        <p:spPr>
-          <a:xfrm>
-            <a:off x="7678268" y="947602"/>
-            <a:ext cx="3491755" cy="2860285"/>
-          </a:xfrm>
-          <a:prstGeom prst="roundRect">
-            <a:avLst>
-              <a:gd name="adj" fmla="val 0"/>
-            </a:avLst>
-          </a:prstGeom>
-          <a:noFill/>
-          <a:ln w="28575">
-            <a:solidFill>
-              <a:srgbClr val="00B050"/>
-            </a:solidFill>
-          </a:ln>
-        </p:spPr>
-        <p:style>
-          <a:lnRef idx="2">
-            <a:schemeClr val="accent6"/>
-          </a:lnRef>
-          <a:fillRef idx="1">
-            <a:schemeClr val="lt1"/>
-          </a:fillRef>
-          <a:effectRef idx="0">
-            <a:schemeClr val="accent6"/>
-          </a:effectRef>
-          <a:fontRef idx="minor">
-            <a:schemeClr val="dk1"/>
-          </a:fontRef>
-        </p:style>
-        <p:txBody>
-          <a:bodyPr rtlCol="0" anchor="ctr"/>
-          <a:lstStyle/>
-          <a:p>
-            <a:pPr algn="ctr"/>
-            <a:endParaRPr lang="de-DE"/>
-          </a:p>
-        </p:txBody>
-      </p:sp>
-    </p:spTree>
-    <p:extLst>
-      <p:ext uri="{BB962C8B-B14F-4D97-AF65-F5344CB8AC3E}">
-        <p14:creationId xmlns:p14="http://schemas.microsoft.com/office/powerpoint/2010/main" val="3885605744"/>
       </p:ext>
     </p:extLst>
   </p:cSld>

</xml_diff>

<commit_message>
plotting and cbpt stuff
</commit_message>
<xml_diff>
--- a/220826_update_dataanalyses.pptx
+++ b/220826_update_dataanalyses.pptx
@@ -20,7 +20,10 @@
     <p:sldId id="268" r:id="rId14"/>
     <p:sldId id="269" r:id="rId15"/>
     <p:sldId id="270" r:id="rId16"/>
-    <p:sldId id="271" r:id="rId17"/>
+    <p:sldId id="277" r:id="rId17"/>
+    <p:sldId id="276" r:id="rId18"/>
+    <p:sldId id="275" r:id="rId19"/>
+    <p:sldId id="271" r:id="rId20"/>
   </p:sldIdLst>
   <p:sldSz cx="12192000" cy="6858000"/>
   <p:notesSz cx="6858000" cy="9144000"/>
@@ -274,7 +277,7 @@
           <a:p>
             <a:fld id="{1F8074E5-8295-406D-869B-65A06D05B2D0}" type="datetimeFigureOut">
               <a:rPr lang="de-DE" smtClean="0"/>
-              <a:t>30.08.2022</a:t>
+              <a:t>31.08.2022</a:t>
             </a:fld>
             <a:endParaRPr lang="de-DE"/>
           </a:p>
@@ -472,7 +475,7 @@
           <a:p>
             <a:fld id="{1F8074E5-8295-406D-869B-65A06D05B2D0}" type="datetimeFigureOut">
               <a:rPr lang="de-DE" smtClean="0"/>
-              <a:t>30.08.2022</a:t>
+              <a:t>31.08.2022</a:t>
             </a:fld>
             <a:endParaRPr lang="de-DE"/>
           </a:p>
@@ -680,7 +683,7 @@
           <a:p>
             <a:fld id="{1F8074E5-8295-406D-869B-65A06D05B2D0}" type="datetimeFigureOut">
               <a:rPr lang="de-DE" smtClean="0"/>
-              <a:t>30.08.2022</a:t>
+              <a:t>31.08.2022</a:t>
             </a:fld>
             <a:endParaRPr lang="de-DE"/>
           </a:p>
@@ -878,7 +881,7 @@
           <a:p>
             <a:fld id="{1F8074E5-8295-406D-869B-65A06D05B2D0}" type="datetimeFigureOut">
               <a:rPr lang="de-DE" smtClean="0"/>
-              <a:t>30.08.2022</a:t>
+              <a:t>31.08.2022</a:t>
             </a:fld>
             <a:endParaRPr lang="de-DE"/>
           </a:p>
@@ -1153,7 +1156,7 @@
           <a:p>
             <a:fld id="{1F8074E5-8295-406D-869B-65A06D05B2D0}" type="datetimeFigureOut">
               <a:rPr lang="de-DE" smtClean="0"/>
-              <a:t>30.08.2022</a:t>
+              <a:t>31.08.2022</a:t>
             </a:fld>
             <a:endParaRPr lang="de-DE"/>
           </a:p>
@@ -1418,7 +1421,7 @@
           <a:p>
             <a:fld id="{1F8074E5-8295-406D-869B-65A06D05B2D0}" type="datetimeFigureOut">
               <a:rPr lang="de-DE" smtClean="0"/>
-              <a:t>30.08.2022</a:t>
+              <a:t>31.08.2022</a:t>
             </a:fld>
             <a:endParaRPr lang="de-DE"/>
           </a:p>
@@ -1830,7 +1833,7 @@
           <a:p>
             <a:fld id="{1F8074E5-8295-406D-869B-65A06D05B2D0}" type="datetimeFigureOut">
               <a:rPr lang="de-DE" smtClean="0"/>
-              <a:t>30.08.2022</a:t>
+              <a:t>31.08.2022</a:t>
             </a:fld>
             <a:endParaRPr lang="de-DE"/>
           </a:p>
@@ -1971,7 +1974,7 @@
           <a:p>
             <a:fld id="{1F8074E5-8295-406D-869B-65A06D05B2D0}" type="datetimeFigureOut">
               <a:rPr lang="de-DE" smtClean="0"/>
-              <a:t>30.08.2022</a:t>
+              <a:t>31.08.2022</a:t>
             </a:fld>
             <a:endParaRPr lang="de-DE"/>
           </a:p>
@@ -2084,7 +2087,7 @@
           <a:p>
             <a:fld id="{1F8074E5-8295-406D-869B-65A06D05B2D0}" type="datetimeFigureOut">
               <a:rPr lang="de-DE" smtClean="0"/>
-              <a:t>30.08.2022</a:t>
+              <a:t>31.08.2022</a:t>
             </a:fld>
             <a:endParaRPr lang="de-DE"/>
           </a:p>
@@ -2395,7 +2398,7 @@
           <a:p>
             <a:fld id="{1F8074E5-8295-406D-869B-65A06D05B2D0}" type="datetimeFigureOut">
               <a:rPr lang="de-DE" smtClean="0"/>
-              <a:t>30.08.2022</a:t>
+              <a:t>31.08.2022</a:t>
             </a:fld>
             <a:endParaRPr lang="de-DE"/>
           </a:p>
@@ -2683,7 +2686,7 @@
           <a:p>
             <a:fld id="{1F8074E5-8295-406D-869B-65A06D05B2D0}" type="datetimeFigureOut">
               <a:rPr lang="de-DE" smtClean="0"/>
-              <a:t>30.08.2022</a:t>
+              <a:t>31.08.2022</a:t>
             </a:fld>
             <a:endParaRPr lang="de-DE"/>
           </a:p>
@@ -2924,7 +2927,7 @@
           <a:p>
             <a:fld id="{1F8074E5-8295-406D-869B-65A06D05B2D0}" type="datetimeFigureOut">
               <a:rPr lang="de-DE" smtClean="0"/>
-              <a:t>30.08.2022</a:t>
+              <a:t>31.08.2022</a:t>
             </a:fld>
             <a:endParaRPr lang="de-DE"/>
           </a:p>
@@ -3819,39 +3822,67 @@
             <p:ph type="title"/>
           </p:nvPr>
         </p:nvSpPr>
-        <p:spPr/>
-        <p:txBody>
-          <a:bodyPr/>
-          <a:lstStyle/>
-          <a:p>
-            <a:r>
-              <a:rPr lang="de-DE" dirty="0"/>
+        <p:spPr>
+          <a:xfrm>
+            <a:off x="838200" y="398578"/>
+            <a:ext cx="10515600" cy="1325563"/>
+          </a:xfrm>
+        </p:spPr>
+        <p:txBody>
+          <a:bodyPr>
+            <a:normAutofit/>
+          </a:bodyPr>
+          <a:lstStyle/>
+          <a:p>
+            <a:r>
+              <a:rPr lang="de-DE" sz="3500" dirty="0"/>
               <a:t>Cluster-</a:t>
             </a:r>
             <a:r>
-              <a:rPr lang="de-DE" dirty="0" err="1"/>
+              <a:rPr lang="de-DE" sz="3500" dirty="0" err="1"/>
               <a:t>based</a:t>
             </a:r>
             <a:r>
-              <a:rPr lang="de-DE" dirty="0"/>
-              <a:t> </a:t>
-            </a:r>
-            <a:r>
-              <a:rPr lang="de-DE" dirty="0" err="1"/>
+              <a:rPr lang="de-DE" sz="3500" dirty="0"/>
+              <a:t> </a:t>
+            </a:r>
+            <a:r>
+              <a:rPr lang="de-DE" sz="3500" dirty="0" err="1"/>
               <a:t>permutation</a:t>
             </a:r>
             <a:r>
-              <a:rPr lang="de-DE" dirty="0"/>
-              <a:t> </a:t>
-            </a:r>
-            <a:r>
-              <a:rPr lang="de-DE" dirty="0" err="1"/>
+              <a:rPr lang="de-DE" sz="3500" dirty="0"/>
+              <a:t> </a:t>
+            </a:r>
+            <a:r>
+              <a:rPr lang="de-DE" sz="3500" dirty="0" err="1"/>
               <a:t>test</a:t>
             </a:r>
             <a:r>
-              <a:rPr lang="de-DE" dirty="0"/>
-              <a:t>: Task A</a:t>
-            </a:r>
+              <a:rPr lang="de-DE" sz="3500" dirty="0"/>
+              <a:t>: Task A, </a:t>
+            </a:r>
+            <a:r>
+              <a:rPr lang="de-DE" sz="3500" dirty="0" err="1"/>
+              <a:t>averaged</a:t>
+            </a:r>
+            <a:r>
+              <a:rPr lang="de-DE" sz="3500" dirty="0"/>
+              <a:t> </a:t>
+            </a:r>
+            <a:r>
+              <a:rPr lang="de-DE" sz="3500" dirty="0" err="1"/>
+              <a:t>across</a:t>
+            </a:r>
+            <a:r>
+              <a:rPr lang="de-DE" sz="3500" dirty="0"/>
+              <a:t> </a:t>
+            </a:r>
+            <a:r>
+              <a:rPr lang="de-DE" sz="3500" dirty="0" err="1"/>
+              <a:t>frequencies</a:t>
+            </a:r>
+            <a:endParaRPr lang="de-DE" sz="3500" dirty="0"/>
           </a:p>
         </p:txBody>
       </p:sp>
@@ -3874,7 +3905,7 @@
         <p:spPr/>
         <p:txBody>
           <a:bodyPr>
-            <a:normAutofit lnSpcReduction="10000"/>
+            <a:normAutofit fontScale="85000" lnSpcReduction="20000"/>
           </a:bodyPr>
           <a:lstStyle/>
           <a:p>
@@ -3915,7 +3946,15 @@
             </a:r>
             <a:r>
               <a:rPr lang="de-DE" dirty="0"/>
-              <a:t> band: 5 negative </a:t>
+              <a:t> band: 1 </a:t>
+            </a:r>
+            <a:r>
+              <a:rPr lang="de-DE" dirty="0" err="1"/>
+              <a:t>sig</a:t>
+            </a:r>
+            <a:r>
+              <a:rPr lang="de-DE" dirty="0"/>
+              <a:t>. negative </a:t>
             </a:r>
             <a:r>
               <a:rPr lang="de-DE" dirty="0" err="1"/>
@@ -3923,15 +3962,7 @@
             </a:r>
             <a:r>
               <a:rPr lang="de-DE" dirty="0"/>
-              <a:t> (</a:t>
-            </a:r>
-            <a:r>
-              <a:rPr lang="de-DE" dirty="0" err="1"/>
-              <a:t>sig</a:t>
-            </a:r>
-            <a:r>
-              <a:rPr lang="de-DE" dirty="0"/>
-              <a:t>)</a:t>
+              <a:t> </a:t>
             </a:r>
           </a:p>
           <a:p>
@@ -3958,7 +3989,15 @@
             </a:r>
             <a:r>
               <a:rPr lang="de-DE" dirty="0"/>
-              <a:t> band: 9 negative </a:t>
+              <a:t> band: 7 </a:t>
+            </a:r>
+            <a:r>
+              <a:rPr lang="de-DE" dirty="0" err="1"/>
+              <a:t>sig</a:t>
+            </a:r>
+            <a:r>
+              <a:rPr lang="de-DE" dirty="0"/>
+              <a:t>. negative </a:t>
             </a:r>
             <a:r>
               <a:rPr lang="de-DE" dirty="0" err="1"/>
@@ -3966,7 +4005,34 @@
             </a:r>
             <a:r>
               <a:rPr lang="de-DE" dirty="0"/>
-              <a:t> (</a:t>
+              <a:t> </a:t>
+            </a:r>
+          </a:p>
+          <a:p>
+            <a:pPr lvl="1"/>
+            <a:r>
+              <a:rPr lang="de-DE" b="1" dirty="0" err="1"/>
+              <a:t>Significant</a:t>
+            </a:r>
+            <a:r>
+              <a:rPr lang="de-DE" b="1" dirty="0"/>
+              <a:t> </a:t>
+            </a:r>
+            <a:r>
+              <a:rPr lang="de-DE" dirty="0" err="1"/>
+              <a:t>difference</a:t>
+            </a:r>
+            <a:r>
+              <a:rPr lang="de-DE" dirty="0"/>
+              <a:t> in </a:t>
+            </a:r>
+            <a:r>
+              <a:rPr lang="de-DE" dirty="0" err="1"/>
+              <a:t>beta</a:t>
+            </a:r>
+            <a:r>
+              <a:rPr lang="de-DE" dirty="0"/>
+              <a:t> band: 1 </a:t>
             </a:r>
             <a:r>
               <a:rPr lang="de-DE" dirty="0" err="1"/>
@@ -3974,8 +4040,13 @@
             </a:r>
             <a:r>
               <a:rPr lang="de-DE" dirty="0"/>
-              <a:t>)</a:t>
-            </a:r>
+              <a:t>. negative </a:t>
+            </a:r>
+            <a:r>
+              <a:rPr lang="de-DE" dirty="0" err="1"/>
+              <a:t>cluster</a:t>
+            </a:r>
+            <a:endParaRPr lang="de-DE" b="1" dirty="0"/>
           </a:p>
           <a:p>
             <a:pPr lvl="1"/>
@@ -4023,11 +4094,11 @@
             </a:r>
             <a:r>
               <a:rPr lang="de-DE" dirty="0" err="1"/>
-              <a:t>pos</a:t>
-            </a:r>
-            <a:r>
-              <a:rPr lang="de-DE" dirty="0"/>
-              <a:t> </a:t>
+              <a:t>sig</a:t>
+            </a:r>
+            <a:r>
+              <a:rPr lang="de-DE" dirty="0"/>
+              <a:t>. positive </a:t>
             </a:r>
             <a:r>
               <a:rPr lang="de-DE" dirty="0" err="1"/>
@@ -4035,15 +4106,7 @@
             </a:r>
             <a:r>
               <a:rPr lang="de-DE" dirty="0"/>
-              <a:t> (</a:t>
-            </a:r>
-            <a:r>
-              <a:rPr lang="de-DE" dirty="0" err="1"/>
-              <a:t>sig</a:t>
-            </a:r>
-            <a:r>
-              <a:rPr lang="de-DE" dirty="0"/>
-              <a:t>)</a:t>
+              <a:t> </a:t>
             </a:r>
           </a:p>
           <a:p>
@@ -4070,32 +4133,64 @@
             </a:r>
             <a:r>
               <a:rPr lang="de-DE" dirty="0"/>
+              <a:t> band: 2 </a:t>
+            </a:r>
+            <a:r>
+              <a:rPr lang="de-DE" dirty="0" err="1"/>
+              <a:t>sig</a:t>
+            </a:r>
+            <a:r>
+              <a:rPr lang="de-DE" dirty="0"/>
+              <a:t>. positive </a:t>
+            </a:r>
+            <a:r>
+              <a:rPr lang="de-DE" dirty="0" err="1"/>
+              <a:t>cluster</a:t>
+            </a:r>
+            <a:r>
+              <a:rPr lang="de-DE" dirty="0"/>
+              <a:t> </a:t>
+            </a:r>
+          </a:p>
+          <a:p>
+            <a:pPr lvl="1"/>
+            <a:r>
+              <a:rPr lang="de-DE" b="1" dirty="0" err="1"/>
+              <a:t>Significant</a:t>
+            </a:r>
+            <a:r>
+              <a:rPr lang="de-DE" dirty="0"/>
+              <a:t> </a:t>
+            </a:r>
+            <a:r>
+              <a:rPr lang="de-DE" dirty="0" err="1"/>
+              <a:t>difference</a:t>
+            </a:r>
+            <a:r>
+              <a:rPr lang="de-DE" dirty="0"/>
+              <a:t> in </a:t>
+            </a:r>
+            <a:r>
+              <a:rPr lang="de-DE" dirty="0" err="1"/>
+              <a:t>beta</a:t>
+            </a:r>
+            <a:r>
+              <a:rPr lang="de-DE" dirty="0"/>
               <a:t> band: 1 </a:t>
             </a:r>
             <a:r>
               <a:rPr lang="de-DE" dirty="0" err="1"/>
-              <a:t>pos</a:t>
-            </a:r>
-            <a:r>
-              <a:rPr lang="de-DE" dirty="0"/>
-              <a:t> </a:t>
+              <a:t>sig</a:t>
+            </a:r>
+            <a:r>
+              <a:rPr lang="de-DE" dirty="0"/>
+              <a:t>. positive </a:t>
             </a:r>
             <a:r>
               <a:rPr lang="de-DE" dirty="0" err="1"/>
               <a:t>cluster</a:t>
             </a:r>
-            <a:r>
-              <a:rPr lang="de-DE" dirty="0"/>
-              <a:t> (</a:t>
-            </a:r>
-            <a:r>
-              <a:rPr lang="de-DE" dirty="0" err="1"/>
-              <a:t>sig</a:t>
-            </a:r>
-            <a:r>
-              <a:rPr lang="de-DE" dirty="0"/>
-              <a:t>), </a:t>
-            </a:r>
+            <a:endParaRPr lang="de-DE" dirty="0"/>
           </a:p>
           <a:p>
             <a:pPr marL="0" indent="0">
@@ -4181,6 +4276,41 @@
             <a:r>
               <a:rPr lang="de-DE" dirty="0" err="1"/>
               <a:t>alpha</a:t>
+            </a:r>
+            <a:r>
+              <a:rPr lang="de-DE" dirty="0"/>
+              <a:t> band</a:t>
+            </a:r>
+          </a:p>
+          <a:p>
+            <a:pPr lvl="1"/>
+            <a:r>
+              <a:rPr lang="de-DE" dirty="0" err="1"/>
+              <a:t>No</a:t>
+            </a:r>
+            <a:r>
+              <a:rPr lang="de-DE" dirty="0"/>
+              <a:t> </a:t>
+            </a:r>
+            <a:r>
+              <a:rPr lang="de-DE" dirty="0" err="1"/>
+              <a:t>significant</a:t>
+            </a:r>
+            <a:r>
+              <a:rPr lang="de-DE" dirty="0"/>
+              <a:t> </a:t>
+            </a:r>
+            <a:r>
+              <a:rPr lang="de-DE" dirty="0" err="1"/>
+              <a:t>diference</a:t>
+            </a:r>
+            <a:r>
+              <a:rPr lang="de-DE" dirty="0"/>
+              <a:t> in </a:t>
+            </a:r>
+            <a:r>
+              <a:rPr lang="de-DE" dirty="0" err="1"/>
+              <a:t>beta</a:t>
             </a:r>
             <a:r>
               <a:rPr lang="de-DE" dirty="0"/>
@@ -5546,6 +5676,860 @@
             </a:r>
             <a:r>
               <a:rPr lang="de-DE" dirty="0"/>
+              <a:t> band: 1 </a:t>
+            </a:r>
+            <a:r>
+              <a:rPr lang="de-DE" dirty="0" err="1"/>
+              <a:t>sig</a:t>
+            </a:r>
+            <a:r>
+              <a:rPr lang="de-DE" dirty="0"/>
+              <a:t>. negative </a:t>
+            </a:r>
+            <a:r>
+              <a:rPr lang="de-DE" dirty="0" err="1"/>
+              <a:t>cluster</a:t>
+            </a:r>
+            <a:endParaRPr lang="de-DE" dirty="0"/>
+          </a:p>
+          <a:p>
+            <a:pPr lvl="1"/>
+            <a:r>
+              <a:rPr lang="de-DE" dirty="0" err="1"/>
+              <a:t>No</a:t>
+            </a:r>
+            <a:r>
+              <a:rPr lang="de-DE" dirty="0"/>
+              <a:t> </a:t>
+            </a:r>
+            <a:r>
+              <a:rPr lang="de-DE" dirty="0" err="1"/>
+              <a:t>significant</a:t>
+            </a:r>
+            <a:r>
+              <a:rPr lang="de-DE" dirty="0"/>
+              <a:t> </a:t>
+            </a:r>
+            <a:r>
+              <a:rPr lang="de-DE" dirty="0" err="1"/>
+              <a:t>difference</a:t>
+            </a:r>
+            <a:r>
+              <a:rPr lang="de-DE" dirty="0"/>
+              <a:t> in </a:t>
+            </a:r>
+            <a:r>
+              <a:rPr lang="de-DE" dirty="0" err="1"/>
+              <a:t>alpha</a:t>
+            </a:r>
+            <a:r>
+              <a:rPr lang="de-DE" dirty="0"/>
+              <a:t> band</a:t>
+            </a:r>
+          </a:p>
+          <a:p>
+            <a:pPr lvl="1"/>
+            <a:r>
+              <a:rPr lang="de-DE" dirty="0" err="1"/>
+              <a:t>No</a:t>
+            </a:r>
+            <a:r>
+              <a:rPr lang="de-DE" dirty="0"/>
+              <a:t> </a:t>
+            </a:r>
+            <a:r>
+              <a:rPr lang="de-DE" dirty="0" err="1"/>
+              <a:t>significant</a:t>
+            </a:r>
+            <a:r>
+              <a:rPr lang="de-DE" dirty="0"/>
+              <a:t> </a:t>
+            </a:r>
+            <a:r>
+              <a:rPr lang="de-DE" dirty="0" err="1"/>
+              <a:t>difference</a:t>
+            </a:r>
+            <a:r>
+              <a:rPr lang="de-DE" dirty="0"/>
+              <a:t> in </a:t>
+            </a:r>
+            <a:r>
+              <a:rPr lang="de-DE" dirty="0" err="1"/>
+              <a:t>beta</a:t>
+            </a:r>
+            <a:r>
+              <a:rPr lang="de-DE" dirty="0"/>
+              <a:t> band</a:t>
+            </a:r>
+          </a:p>
+        </p:txBody>
+      </p:sp>
+      <p:sp>
+        <p:nvSpPr>
+          <p:cNvPr id="4" name="Titel 1">
+            <a:extLst>
+              <a:ext uri="{FF2B5EF4-FFF2-40B4-BE49-F238E27FC236}">
+                <a16:creationId xmlns:a16="http://schemas.microsoft.com/office/drawing/2014/main" id="{D7F27B8C-6DF8-4DF3-BD58-26814F92731E}"/>
+              </a:ext>
+            </a:extLst>
+          </p:cNvPr>
+          <p:cNvSpPr>
+            <a:spLocks noGrp="1"/>
+          </p:cNvSpPr>
+          <p:nvPr>
+            <p:ph type="title"/>
+          </p:nvPr>
+        </p:nvSpPr>
+        <p:spPr>
+          <a:xfrm>
+            <a:off x="838200" y="365125"/>
+            <a:ext cx="10515600" cy="1325563"/>
+          </a:xfrm>
+        </p:spPr>
+        <p:txBody>
+          <a:bodyPr/>
+          <a:lstStyle/>
+          <a:p>
+            <a:r>
+              <a:rPr lang="de-DE" dirty="0"/>
+              <a:t>Cluster-</a:t>
+            </a:r>
+            <a:r>
+              <a:rPr lang="de-DE" dirty="0" err="1"/>
+              <a:t>based</a:t>
+            </a:r>
+            <a:r>
+              <a:rPr lang="de-DE" dirty="0"/>
+              <a:t> </a:t>
+            </a:r>
+            <a:r>
+              <a:rPr lang="de-DE" dirty="0" err="1"/>
+              <a:t>permutation</a:t>
+            </a:r>
+            <a:r>
+              <a:rPr lang="de-DE" dirty="0"/>
+              <a:t> </a:t>
+            </a:r>
+            <a:r>
+              <a:rPr lang="de-DE" dirty="0" err="1"/>
+              <a:t>test</a:t>
+            </a:r>
+            <a:r>
+              <a:rPr lang="de-DE" dirty="0"/>
+              <a:t>: Task B</a:t>
+            </a:r>
+          </a:p>
+        </p:txBody>
+      </p:sp>
+      <p:sp>
+        <p:nvSpPr>
+          <p:cNvPr id="5" name="Textfeld 4">
+            <a:extLst>
+              <a:ext uri="{FF2B5EF4-FFF2-40B4-BE49-F238E27FC236}">
+                <a16:creationId xmlns:a16="http://schemas.microsoft.com/office/drawing/2014/main" id="{EC02A2A2-F128-4EF4-BD19-ABF7BD0AD4B6}"/>
+              </a:ext>
+            </a:extLst>
+          </p:cNvPr>
+          <p:cNvSpPr txBox="1"/>
+          <p:nvPr/>
+        </p:nvSpPr>
+        <p:spPr>
+          <a:xfrm>
+            <a:off x="9305365" y="59172"/>
+            <a:ext cx="2635623" cy="646331"/>
+          </a:xfrm>
+          <a:prstGeom prst="rect">
+            <a:avLst/>
+          </a:prstGeom>
+          <a:noFill/>
+        </p:spPr>
+        <p:txBody>
+          <a:bodyPr wrap="square" rtlCol="0">
+            <a:spAutoFit/>
+          </a:bodyPr>
+          <a:lstStyle/>
+          <a:p>
+            <a:r>
+              <a:rPr lang="de-DE" dirty="0"/>
+              <a:t>Cluster </a:t>
+            </a:r>
+            <a:r>
+              <a:rPr lang="de-DE" dirty="0" err="1"/>
+              <a:t>alpha</a:t>
+            </a:r>
+            <a:r>
+              <a:rPr lang="de-DE" dirty="0"/>
+              <a:t> = 0.001</a:t>
+            </a:r>
+          </a:p>
+          <a:p>
+            <a:r>
+              <a:rPr lang="de-DE" dirty="0"/>
+              <a:t>Alpha = 0.001</a:t>
+            </a:r>
+          </a:p>
+        </p:txBody>
+      </p:sp>
+    </p:spTree>
+    <p:extLst>
+      <p:ext uri="{BB962C8B-B14F-4D97-AF65-F5344CB8AC3E}">
+        <p14:creationId xmlns:p14="http://schemas.microsoft.com/office/powerpoint/2010/main" val="1030475350"/>
+      </p:ext>
+    </p:extLst>
+  </p:cSld>
+  <p:clrMapOvr>
+    <a:masterClrMapping/>
+  </p:clrMapOvr>
+</p:sld>
+</file>
+
+<file path=ppt/slides/slide17.xml><?xml version="1.0" encoding="utf-8"?>
+<p:sld xmlns:a="http://schemas.openxmlformats.org/drawingml/2006/main" xmlns:r="http://schemas.openxmlformats.org/officeDocument/2006/relationships" xmlns:p="http://schemas.openxmlformats.org/presentationml/2006/main">
+  <p:cSld>
+    <p:spTree>
+      <p:nvGrpSpPr>
+        <p:cNvPr id="1" name=""/>
+        <p:cNvGrpSpPr/>
+        <p:nvPr/>
+      </p:nvGrpSpPr>
+      <p:grpSpPr>
+        <a:xfrm>
+          <a:off x="0" y="0"/>
+          <a:ext cx="0" cy="0"/>
+          <a:chOff x="0" y="0"/>
+          <a:chExt cx="0" cy="0"/>
+        </a:xfrm>
+      </p:grpSpPr>
+      <p:sp>
+        <p:nvSpPr>
+          <p:cNvPr id="2" name="Titel 1">
+            <a:extLst>
+              <a:ext uri="{FF2B5EF4-FFF2-40B4-BE49-F238E27FC236}">
+                <a16:creationId xmlns:a16="http://schemas.microsoft.com/office/drawing/2014/main" id="{8F1F2F4B-7166-4F0C-B1D5-DEFA38C15280}"/>
+              </a:ext>
+            </a:extLst>
+          </p:cNvPr>
+          <p:cNvSpPr>
+            <a:spLocks noGrp="1"/>
+          </p:cNvSpPr>
+          <p:nvPr>
+            <p:ph type="title"/>
+          </p:nvPr>
+        </p:nvSpPr>
+        <p:spPr>
+          <a:xfrm>
+            <a:off x="994317" y="2350043"/>
+            <a:ext cx="10515600" cy="1325563"/>
+          </a:xfrm>
+        </p:spPr>
+        <p:txBody>
+          <a:bodyPr/>
+          <a:lstStyle/>
+          <a:p>
+            <a:r>
+              <a:rPr lang="de-DE" dirty="0" err="1"/>
+              <a:t>old</a:t>
+            </a:r>
+            <a:endParaRPr lang="de-DE" dirty="0"/>
+          </a:p>
+        </p:txBody>
+      </p:sp>
+    </p:spTree>
+    <p:extLst>
+      <p:ext uri="{BB962C8B-B14F-4D97-AF65-F5344CB8AC3E}">
+        <p14:creationId xmlns:p14="http://schemas.microsoft.com/office/powerpoint/2010/main" val="3419020458"/>
+      </p:ext>
+    </p:extLst>
+  </p:cSld>
+  <p:clrMapOvr>
+    <a:masterClrMapping/>
+  </p:clrMapOvr>
+</p:sld>
+</file>
+
+<file path=ppt/slides/slide18.xml><?xml version="1.0" encoding="utf-8"?>
+<p:sld xmlns:a="http://schemas.openxmlformats.org/drawingml/2006/main" xmlns:r="http://schemas.openxmlformats.org/officeDocument/2006/relationships" xmlns:p="http://schemas.openxmlformats.org/presentationml/2006/main">
+  <p:cSld>
+    <p:spTree>
+      <p:nvGrpSpPr>
+        <p:cNvPr id="1" name=""/>
+        <p:cNvGrpSpPr/>
+        <p:nvPr/>
+      </p:nvGrpSpPr>
+      <p:grpSpPr>
+        <a:xfrm>
+          <a:off x="0" y="0"/>
+          <a:ext cx="0" cy="0"/>
+          <a:chOff x="0" y="0"/>
+          <a:chExt cx="0" cy="0"/>
+        </a:xfrm>
+      </p:grpSpPr>
+      <p:sp>
+        <p:nvSpPr>
+          <p:cNvPr id="2" name="Titel 1">
+            <a:extLst>
+              <a:ext uri="{FF2B5EF4-FFF2-40B4-BE49-F238E27FC236}">
+                <a16:creationId xmlns:a16="http://schemas.microsoft.com/office/drawing/2014/main" id="{E8D505D1-C9ED-45EB-ABF9-12C67A397336}"/>
+              </a:ext>
+            </a:extLst>
+          </p:cNvPr>
+          <p:cNvSpPr>
+            <a:spLocks noGrp="1"/>
+          </p:cNvSpPr>
+          <p:nvPr>
+            <p:ph type="title"/>
+          </p:nvPr>
+        </p:nvSpPr>
+        <p:spPr>
+          <a:xfrm>
+            <a:off x="838200" y="398578"/>
+            <a:ext cx="10515600" cy="1325563"/>
+          </a:xfrm>
+        </p:spPr>
+        <p:txBody>
+          <a:bodyPr>
+            <a:normAutofit/>
+          </a:bodyPr>
+          <a:lstStyle/>
+          <a:p>
+            <a:r>
+              <a:rPr lang="de-DE" sz="3500" dirty="0"/>
+              <a:t>Cluster-</a:t>
+            </a:r>
+            <a:r>
+              <a:rPr lang="de-DE" sz="3500" dirty="0" err="1"/>
+              <a:t>based</a:t>
+            </a:r>
+            <a:r>
+              <a:rPr lang="de-DE" sz="3500" dirty="0"/>
+              <a:t> </a:t>
+            </a:r>
+            <a:r>
+              <a:rPr lang="de-DE" sz="3500" dirty="0" err="1"/>
+              <a:t>permutation</a:t>
+            </a:r>
+            <a:r>
+              <a:rPr lang="de-DE" sz="3500" dirty="0"/>
+              <a:t> </a:t>
+            </a:r>
+            <a:r>
+              <a:rPr lang="de-DE" sz="3500" dirty="0" err="1"/>
+              <a:t>test</a:t>
+            </a:r>
+            <a:r>
+              <a:rPr lang="de-DE" sz="3500" dirty="0"/>
+              <a:t>: Task A, (</a:t>
+            </a:r>
+            <a:r>
+              <a:rPr lang="de-DE" sz="3500" dirty="0" err="1"/>
+              <a:t>no</a:t>
+            </a:r>
+            <a:r>
+              <a:rPr lang="de-DE" sz="3500" dirty="0"/>
+              <a:t> </a:t>
+            </a:r>
+            <a:r>
+              <a:rPr lang="de-DE" sz="3500" dirty="0" err="1"/>
+              <a:t>avg</a:t>
+            </a:r>
+            <a:r>
+              <a:rPr lang="de-DE" sz="3500" dirty="0"/>
+              <a:t>. </a:t>
+            </a:r>
+            <a:r>
+              <a:rPr lang="de-DE" sz="3500" dirty="0" err="1"/>
+              <a:t>across</a:t>
+            </a:r>
+            <a:r>
+              <a:rPr lang="de-DE" sz="3500" dirty="0"/>
+              <a:t> </a:t>
+            </a:r>
+            <a:r>
+              <a:rPr lang="de-DE" sz="3500" dirty="0" err="1"/>
+              <a:t>frequencies</a:t>
+            </a:r>
+            <a:r>
+              <a:rPr lang="de-DE" sz="3500" dirty="0"/>
+              <a:t> </a:t>
+            </a:r>
+            <a:r>
+              <a:rPr lang="de-DE" sz="3500" dirty="0" err="1"/>
+              <a:t>or</a:t>
+            </a:r>
+            <a:r>
+              <a:rPr lang="de-DE" sz="3500" dirty="0"/>
+              <a:t> time)</a:t>
+            </a:r>
+          </a:p>
+        </p:txBody>
+      </p:sp>
+      <p:sp>
+        <p:nvSpPr>
+          <p:cNvPr id="3" name="Inhaltsplatzhalter 2">
+            <a:extLst>
+              <a:ext uri="{FF2B5EF4-FFF2-40B4-BE49-F238E27FC236}">
+                <a16:creationId xmlns:a16="http://schemas.microsoft.com/office/drawing/2014/main" id="{F44E030C-11C5-472B-900D-BC76B88397E0}"/>
+              </a:ext>
+            </a:extLst>
+          </p:cNvPr>
+          <p:cNvSpPr>
+            <a:spLocks noGrp="1"/>
+          </p:cNvSpPr>
+          <p:nvPr>
+            <p:ph idx="1"/>
+          </p:nvPr>
+        </p:nvSpPr>
+        <p:spPr/>
+        <p:txBody>
+          <a:bodyPr>
+            <a:normAutofit lnSpcReduction="10000"/>
+          </a:bodyPr>
+          <a:lstStyle/>
+          <a:p>
+            <a:r>
+              <a:rPr lang="de-DE" dirty="0"/>
+              <a:t>Constant vs. </a:t>
+            </a:r>
+            <a:r>
+              <a:rPr lang="de-DE" dirty="0" err="1"/>
+              <a:t>random</a:t>
+            </a:r>
+            <a:r>
+              <a:rPr lang="de-DE" dirty="0"/>
+              <a:t> 1:</a:t>
+            </a:r>
+          </a:p>
+          <a:p>
+            <a:pPr lvl="1"/>
+            <a:r>
+              <a:rPr lang="de-DE" b="1" dirty="0" err="1"/>
+              <a:t>Significant</a:t>
+            </a:r>
+            <a:r>
+              <a:rPr lang="de-DE" dirty="0"/>
+              <a:t> </a:t>
+            </a:r>
+            <a:r>
+              <a:rPr lang="de-DE" dirty="0" err="1"/>
+              <a:t>difference</a:t>
+            </a:r>
+            <a:r>
+              <a:rPr lang="de-DE" dirty="0"/>
+              <a:t> in </a:t>
+            </a:r>
+            <a:r>
+              <a:rPr lang="de-DE" dirty="0" err="1"/>
+              <a:t>theta</a:t>
+            </a:r>
+            <a:r>
+              <a:rPr lang="de-DE" dirty="0"/>
+              <a:t> band: 5 </a:t>
+            </a:r>
+            <a:r>
+              <a:rPr lang="de-DE" dirty="0" err="1"/>
+              <a:t>sig</a:t>
+            </a:r>
+            <a:r>
+              <a:rPr lang="de-DE" dirty="0"/>
+              <a:t>. negative </a:t>
+            </a:r>
+            <a:r>
+              <a:rPr lang="de-DE" dirty="0" err="1"/>
+              <a:t>clusters</a:t>
+            </a:r>
+            <a:r>
+              <a:rPr lang="de-DE" dirty="0"/>
+              <a:t> </a:t>
+            </a:r>
+          </a:p>
+          <a:p>
+            <a:pPr lvl="1"/>
+            <a:r>
+              <a:rPr lang="de-DE" b="1" dirty="0" err="1"/>
+              <a:t>Significant</a:t>
+            </a:r>
+            <a:r>
+              <a:rPr lang="de-DE" b="1" dirty="0"/>
+              <a:t> </a:t>
+            </a:r>
+            <a:r>
+              <a:rPr lang="de-DE" dirty="0" err="1"/>
+              <a:t>difference</a:t>
+            </a:r>
+            <a:r>
+              <a:rPr lang="de-DE" dirty="0"/>
+              <a:t> in </a:t>
+            </a:r>
+            <a:r>
+              <a:rPr lang="de-DE" dirty="0" err="1"/>
+              <a:t>alpha</a:t>
+            </a:r>
+            <a:r>
+              <a:rPr lang="de-DE" dirty="0"/>
+              <a:t> band: 9 </a:t>
+            </a:r>
+            <a:r>
+              <a:rPr lang="de-DE" dirty="0" err="1"/>
+              <a:t>sig</a:t>
+            </a:r>
+            <a:r>
+              <a:rPr lang="de-DE" dirty="0"/>
+              <a:t>. negative </a:t>
+            </a:r>
+            <a:r>
+              <a:rPr lang="de-DE" dirty="0" err="1"/>
+              <a:t>clusters</a:t>
+            </a:r>
+            <a:r>
+              <a:rPr lang="de-DE" dirty="0"/>
+              <a:t> </a:t>
+            </a:r>
+          </a:p>
+          <a:p>
+            <a:pPr lvl="1"/>
+            <a:endParaRPr lang="de-DE" dirty="0"/>
+          </a:p>
+          <a:p>
+            <a:r>
+              <a:rPr lang="de-DE" dirty="0"/>
+              <a:t>Constant vs. </a:t>
+            </a:r>
+            <a:r>
+              <a:rPr lang="de-DE" dirty="0" err="1"/>
+              <a:t>random</a:t>
+            </a:r>
+            <a:r>
+              <a:rPr lang="de-DE" dirty="0"/>
+              <a:t> 2:</a:t>
+            </a:r>
+          </a:p>
+          <a:p>
+            <a:pPr lvl="1"/>
+            <a:r>
+              <a:rPr lang="de-DE" b="1" dirty="0" err="1"/>
+              <a:t>Significant</a:t>
+            </a:r>
+            <a:r>
+              <a:rPr lang="de-DE" dirty="0"/>
+              <a:t> </a:t>
+            </a:r>
+            <a:r>
+              <a:rPr lang="de-DE" dirty="0" err="1"/>
+              <a:t>difference</a:t>
+            </a:r>
+            <a:r>
+              <a:rPr lang="de-DE" dirty="0"/>
+              <a:t> in </a:t>
+            </a:r>
+            <a:r>
+              <a:rPr lang="de-DE" dirty="0" err="1"/>
+              <a:t>theta</a:t>
+            </a:r>
+            <a:r>
+              <a:rPr lang="de-DE" dirty="0"/>
+              <a:t> band:  1 </a:t>
+            </a:r>
+            <a:r>
+              <a:rPr lang="de-DE" dirty="0" err="1"/>
+              <a:t>sig</a:t>
+            </a:r>
+            <a:r>
+              <a:rPr lang="de-DE" dirty="0"/>
+              <a:t>. positive </a:t>
+            </a:r>
+            <a:r>
+              <a:rPr lang="de-DE" dirty="0" err="1"/>
+              <a:t>cluster</a:t>
+            </a:r>
+            <a:r>
+              <a:rPr lang="de-DE" dirty="0"/>
+              <a:t> </a:t>
+            </a:r>
+          </a:p>
+          <a:p>
+            <a:pPr lvl="1"/>
+            <a:r>
+              <a:rPr lang="de-DE" b="1" dirty="0" err="1"/>
+              <a:t>Significant</a:t>
+            </a:r>
+            <a:r>
+              <a:rPr lang="de-DE" dirty="0"/>
+              <a:t> </a:t>
+            </a:r>
+            <a:r>
+              <a:rPr lang="de-DE" dirty="0" err="1"/>
+              <a:t>difference</a:t>
+            </a:r>
+            <a:r>
+              <a:rPr lang="de-DE" dirty="0"/>
+              <a:t> in </a:t>
+            </a:r>
+            <a:r>
+              <a:rPr lang="de-DE" dirty="0" err="1"/>
+              <a:t>alpha</a:t>
+            </a:r>
+            <a:r>
+              <a:rPr lang="de-DE" dirty="0"/>
+              <a:t> band: 1 </a:t>
+            </a:r>
+            <a:r>
+              <a:rPr lang="de-DE" dirty="0" err="1"/>
+              <a:t>sig</a:t>
+            </a:r>
+            <a:r>
+              <a:rPr lang="de-DE" dirty="0"/>
+              <a:t>. positive </a:t>
+            </a:r>
+            <a:r>
+              <a:rPr lang="de-DE" dirty="0" err="1"/>
+              <a:t>cluster</a:t>
+            </a:r>
+            <a:r>
+              <a:rPr lang="de-DE" dirty="0"/>
+              <a:t> </a:t>
+            </a:r>
+          </a:p>
+          <a:p>
+            <a:pPr marL="457200" lvl="1" indent="0">
+              <a:buNone/>
+            </a:pPr>
+            <a:endParaRPr lang="de-DE" dirty="0"/>
+          </a:p>
+          <a:p>
+            <a:r>
+              <a:rPr lang="de-DE" dirty="0"/>
+              <a:t>Random 1 vs. </a:t>
+            </a:r>
+            <a:r>
+              <a:rPr lang="de-DE" dirty="0" err="1"/>
+              <a:t>random</a:t>
+            </a:r>
+            <a:r>
+              <a:rPr lang="de-DE" dirty="0"/>
+              <a:t> 2:</a:t>
+            </a:r>
+          </a:p>
+          <a:p>
+            <a:pPr lvl="1"/>
+            <a:r>
+              <a:rPr lang="de-DE" dirty="0" err="1"/>
+              <a:t>No</a:t>
+            </a:r>
+            <a:r>
+              <a:rPr lang="de-DE" dirty="0"/>
+              <a:t> </a:t>
+            </a:r>
+            <a:r>
+              <a:rPr lang="de-DE" dirty="0" err="1"/>
+              <a:t>significant</a:t>
+            </a:r>
+            <a:r>
+              <a:rPr lang="de-DE" dirty="0"/>
+              <a:t> </a:t>
+            </a:r>
+            <a:r>
+              <a:rPr lang="de-DE" dirty="0" err="1"/>
+              <a:t>difference</a:t>
+            </a:r>
+            <a:r>
+              <a:rPr lang="de-DE" dirty="0"/>
+              <a:t> in </a:t>
+            </a:r>
+            <a:r>
+              <a:rPr lang="de-DE" dirty="0" err="1"/>
+              <a:t>theta</a:t>
+            </a:r>
+            <a:r>
+              <a:rPr lang="de-DE" dirty="0"/>
+              <a:t> band</a:t>
+            </a:r>
+          </a:p>
+          <a:p>
+            <a:pPr lvl="1"/>
+            <a:r>
+              <a:rPr lang="de-DE" dirty="0" err="1"/>
+              <a:t>No</a:t>
+            </a:r>
+            <a:r>
+              <a:rPr lang="de-DE" dirty="0"/>
+              <a:t> </a:t>
+            </a:r>
+            <a:r>
+              <a:rPr lang="de-DE" dirty="0" err="1"/>
+              <a:t>significant</a:t>
+            </a:r>
+            <a:r>
+              <a:rPr lang="de-DE" dirty="0"/>
+              <a:t> </a:t>
+            </a:r>
+            <a:r>
+              <a:rPr lang="de-DE" dirty="0" err="1"/>
+              <a:t>difference</a:t>
+            </a:r>
+            <a:r>
+              <a:rPr lang="de-DE" dirty="0"/>
+              <a:t> in </a:t>
+            </a:r>
+            <a:r>
+              <a:rPr lang="de-DE" dirty="0" err="1"/>
+              <a:t>alpha</a:t>
+            </a:r>
+            <a:r>
+              <a:rPr lang="de-DE" dirty="0"/>
+              <a:t> band</a:t>
+            </a:r>
+          </a:p>
+          <a:p>
+            <a:pPr lvl="1"/>
+            <a:endParaRPr lang="de-DE" dirty="0"/>
+          </a:p>
+          <a:p>
+            <a:pPr lvl="1"/>
+            <a:endParaRPr lang="de-DE" dirty="0"/>
+          </a:p>
+        </p:txBody>
+      </p:sp>
+      <p:sp>
+        <p:nvSpPr>
+          <p:cNvPr id="4" name="Textfeld 3">
+            <a:extLst>
+              <a:ext uri="{FF2B5EF4-FFF2-40B4-BE49-F238E27FC236}">
+                <a16:creationId xmlns:a16="http://schemas.microsoft.com/office/drawing/2014/main" id="{03C9F29E-3A36-4D0A-A0FD-B3682B44BF8A}"/>
+              </a:ext>
+            </a:extLst>
+          </p:cNvPr>
+          <p:cNvSpPr txBox="1"/>
+          <p:nvPr/>
+        </p:nvSpPr>
+        <p:spPr>
+          <a:xfrm>
+            <a:off x="9305365" y="59172"/>
+            <a:ext cx="2635623" cy="646331"/>
+          </a:xfrm>
+          <a:prstGeom prst="rect">
+            <a:avLst/>
+          </a:prstGeom>
+          <a:noFill/>
+        </p:spPr>
+        <p:txBody>
+          <a:bodyPr wrap="square" rtlCol="0">
+            <a:spAutoFit/>
+          </a:bodyPr>
+          <a:lstStyle/>
+          <a:p>
+            <a:r>
+              <a:rPr lang="de-DE" dirty="0"/>
+              <a:t>Cluster </a:t>
+            </a:r>
+            <a:r>
+              <a:rPr lang="de-DE" dirty="0" err="1"/>
+              <a:t>alpha</a:t>
+            </a:r>
+            <a:r>
+              <a:rPr lang="de-DE" dirty="0"/>
+              <a:t> = 0.001</a:t>
+            </a:r>
+          </a:p>
+          <a:p>
+            <a:r>
+              <a:rPr lang="de-DE" dirty="0"/>
+              <a:t>Alpha = 0.001</a:t>
+            </a:r>
+          </a:p>
+        </p:txBody>
+      </p:sp>
+    </p:spTree>
+    <p:extLst>
+      <p:ext uri="{BB962C8B-B14F-4D97-AF65-F5344CB8AC3E}">
+        <p14:creationId xmlns:p14="http://schemas.microsoft.com/office/powerpoint/2010/main" val="14543402"/>
+      </p:ext>
+    </p:extLst>
+  </p:cSld>
+  <p:clrMapOvr>
+    <a:masterClrMapping/>
+  </p:clrMapOvr>
+</p:sld>
+</file>
+
+<file path=ppt/slides/slide19.xml><?xml version="1.0" encoding="utf-8"?>
+<p:sld xmlns:a="http://schemas.openxmlformats.org/drawingml/2006/main" xmlns:r="http://schemas.openxmlformats.org/officeDocument/2006/relationships" xmlns:p="http://schemas.openxmlformats.org/presentationml/2006/main">
+  <p:cSld>
+    <p:spTree>
+      <p:nvGrpSpPr>
+        <p:cNvPr id="1" name=""/>
+        <p:cNvGrpSpPr/>
+        <p:nvPr/>
+      </p:nvGrpSpPr>
+      <p:grpSpPr>
+        <a:xfrm>
+          <a:off x="0" y="0"/>
+          <a:ext cx="0" cy="0"/>
+          <a:chOff x="0" y="0"/>
+          <a:chExt cx="0" cy="0"/>
+        </a:xfrm>
+      </p:grpSpPr>
+      <p:sp>
+        <p:nvSpPr>
+          <p:cNvPr id="3" name="Inhaltsplatzhalter 2">
+            <a:extLst>
+              <a:ext uri="{FF2B5EF4-FFF2-40B4-BE49-F238E27FC236}">
+                <a16:creationId xmlns:a16="http://schemas.microsoft.com/office/drawing/2014/main" id="{B436C065-653F-4B3E-BB91-0821B1BEC6C5}"/>
+              </a:ext>
+            </a:extLst>
+          </p:cNvPr>
+          <p:cNvSpPr>
+            <a:spLocks noGrp="1"/>
+          </p:cNvSpPr>
+          <p:nvPr>
+            <p:ph idx="1"/>
+          </p:nvPr>
+        </p:nvSpPr>
+        <p:spPr/>
+        <p:txBody>
+          <a:bodyPr/>
+          <a:lstStyle/>
+          <a:p>
+            <a:r>
+              <a:rPr lang="de-DE" dirty="0" err="1"/>
+              <a:t>Occlusion</a:t>
+            </a:r>
+            <a:r>
+              <a:rPr lang="de-DE" dirty="0"/>
+              <a:t> vs. non-</a:t>
+            </a:r>
+            <a:r>
+              <a:rPr lang="de-DE" dirty="0" err="1"/>
+              <a:t>occlusion</a:t>
+            </a:r>
+            <a:r>
+              <a:rPr lang="de-DE" dirty="0"/>
+              <a:t>:</a:t>
+            </a:r>
+          </a:p>
+          <a:p>
+            <a:pPr lvl="1"/>
+            <a:r>
+              <a:rPr lang="de-DE" dirty="0" err="1"/>
+              <a:t>Significant</a:t>
+            </a:r>
+            <a:r>
+              <a:rPr lang="de-DE" dirty="0"/>
+              <a:t> </a:t>
+            </a:r>
+            <a:r>
+              <a:rPr lang="de-DE" dirty="0" err="1"/>
+              <a:t>difference</a:t>
+            </a:r>
+            <a:r>
+              <a:rPr lang="de-DE" dirty="0"/>
+              <a:t> in </a:t>
+            </a:r>
+            <a:r>
+              <a:rPr lang="de-DE" dirty="0" err="1"/>
+              <a:t>theta</a:t>
+            </a:r>
+            <a:r>
+              <a:rPr lang="de-DE" dirty="0"/>
               <a:t> band: 2 negative </a:t>
             </a:r>
             <a:r>
@@ -6698,7 +7682,19 @@
             </a:r>
             <a:r>
               <a:rPr lang="de-DE" dirty="0"/>
-              <a:t>: 1 </a:t>
+              <a:t>: </a:t>
+            </a:r>
+            <a:r>
+              <a:rPr lang="de-DE" dirty="0">
+                <a:highlight>
+                  <a:srgbClr val="FFFF00"/>
+                </a:highlight>
+              </a:rPr>
+              <a:t>1</a:t>
+            </a:r>
+            <a:r>
+              <a:rPr lang="de-DE" dirty="0"/>
+              <a:t> </a:t>
             </a:r>
             <a:r>
               <a:rPr lang="de-DE" dirty="0" err="1"/>
@@ -6782,35 +7778,27 @@
             <a:pPr lvl="1"/>
             <a:r>
               <a:rPr lang="de-DE" dirty="0" err="1"/>
-              <a:t>Until</a:t>
-            </a:r>
-            <a:r>
-              <a:rPr lang="de-DE" dirty="0"/>
-              <a:t> </a:t>
-            </a:r>
-            <a:r>
-              <a:rPr lang="de-DE" dirty="0" err="1"/>
-              <a:t>now</a:t>
-            </a:r>
-            <a:r>
-              <a:rPr lang="de-DE" dirty="0"/>
-              <a:t> </a:t>
-            </a:r>
-            <a:r>
-              <a:rPr lang="de-DE" dirty="0" err="1"/>
-              <a:t>only</a:t>
-            </a:r>
-            <a:r>
-              <a:rPr lang="de-DE" dirty="0"/>
-              <a:t> </a:t>
-            </a:r>
-            <a:r>
-              <a:rPr lang="de-DE" dirty="0" err="1"/>
-              <a:t>for</a:t>
-            </a:r>
-            <a:r>
-              <a:rPr lang="de-DE" dirty="0"/>
-              <a:t> </a:t>
+              <a:t>For</a:t>
+            </a:r>
+            <a:r>
+              <a:rPr lang="de-DE" dirty="0"/>
+              <a:t> </a:t>
+            </a:r>
+            <a:r>
+              <a:rPr lang="de-DE" dirty="0" err="1"/>
+              <a:t>alpha</a:t>
+            </a:r>
+            <a:r>
+              <a:rPr lang="de-DE" dirty="0"/>
+              <a:t>, </a:t>
+            </a:r>
+            <a:r>
+              <a:rPr lang="de-DE" dirty="0" err="1"/>
+              <a:t>beta</a:t>
+            </a:r>
+            <a:r>
+              <a:rPr lang="de-DE" dirty="0"/>
+              <a:t> and </a:t>
             </a:r>
             <a:r>
               <a:rPr lang="de-DE" dirty="0" err="1"/>
@@ -6818,44 +7806,8 @@
             </a:r>
             <a:r>
               <a:rPr lang="de-DE" dirty="0"/>
-              <a:t> and </a:t>
-            </a:r>
-            <a:r>
-              <a:rPr lang="de-DE" dirty="0" err="1"/>
-              <a:t>alpha</a:t>
-            </a:r>
-            <a:r>
-              <a:rPr lang="de-DE" dirty="0"/>
               <a:t> band</a:t>
             </a:r>
-          </a:p>
-          <a:p>
-            <a:pPr lvl="1"/>
-            <a:r>
-              <a:rPr lang="de-DE" dirty="0"/>
-              <a:t>Not </a:t>
-            </a:r>
-            <a:r>
-              <a:rPr lang="de-DE" dirty="0" err="1"/>
-              <a:t>averaged</a:t>
-            </a:r>
-            <a:r>
-              <a:rPr lang="de-DE" dirty="0"/>
-              <a:t> </a:t>
-            </a:r>
-            <a:r>
-              <a:rPr lang="de-DE" dirty="0" err="1"/>
-              <a:t>over</a:t>
-            </a:r>
-            <a:r>
-              <a:rPr lang="de-DE" dirty="0"/>
-              <a:t> time and </a:t>
-            </a:r>
-            <a:r>
-              <a:rPr lang="de-DE" dirty="0" err="1"/>
-              <a:t>frequencies</a:t>
-            </a:r>
-            <a:endParaRPr lang="de-DE" dirty="0"/>
           </a:p>
         </p:txBody>
       </p:sp>

</xml_diff>